<commit_message>
Tenia repetida una dipositiva
Co-Authored-By: santiagotorres02 <142942603+santiagotorres02@users.noreply.github.com>
</commit_message>
<xml_diff>
--- a/Presentación proyecto 3.pptx
+++ b/Presentación proyecto 3.pptx
@@ -5,77 +5,78 @@
     <p:sldMasterId id="2147483681" r:id="rId1"/>
   </p:sldMasterIdLst>
   <p:notesMasterIdLst>
-    <p:notesMasterId r:id="rId27"/>
+    <p:notesMasterId r:id="rId26"/>
   </p:notesMasterIdLst>
   <p:sldIdLst>
     <p:sldId id="256" r:id="rId2"/>
     <p:sldId id="258" r:id="rId3"/>
     <p:sldId id="260" r:id="rId4"/>
-    <p:sldId id="261" r:id="rId5"/>
-    <p:sldId id="342" r:id="rId6"/>
-    <p:sldId id="313" r:id="rId7"/>
-    <p:sldId id="314" r:id="rId8"/>
-    <p:sldId id="323" r:id="rId9"/>
-    <p:sldId id="333" r:id="rId10"/>
-    <p:sldId id="336" r:id="rId11"/>
-    <p:sldId id="337" r:id="rId12"/>
-    <p:sldId id="338" r:id="rId13"/>
-    <p:sldId id="324" r:id="rId14"/>
-    <p:sldId id="331" r:id="rId15"/>
-    <p:sldId id="332" r:id="rId16"/>
-    <p:sldId id="334" r:id="rId17"/>
-    <p:sldId id="335" r:id="rId18"/>
-    <p:sldId id="326" r:id="rId19"/>
-    <p:sldId id="328" r:id="rId20"/>
-    <p:sldId id="339" r:id="rId21"/>
-    <p:sldId id="340" r:id="rId22"/>
-    <p:sldId id="341" r:id="rId23"/>
-    <p:sldId id="343" r:id="rId24"/>
-    <p:sldId id="329" r:id="rId25"/>
-    <p:sldId id="264" r:id="rId26"/>
+    <p:sldId id="342" r:id="rId5"/>
+    <p:sldId id="313" r:id="rId6"/>
+    <p:sldId id="314" r:id="rId7"/>
+    <p:sldId id="323" r:id="rId8"/>
+    <p:sldId id="333" r:id="rId9"/>
+    <p:sldId id="336" r:id="rId10"/>
+    <p:sldId id="337" r:id="rId11"/>
+    <p:sldId id="338" r:id="rId12"/>
+    <p:sldId id="324" r:id="rId13"/>
+    <p:sldId id="331" r:id="rId14"/>
+    <p:sldId id="332" r:id="rId15"/>
+    <p:sldId id="334" r:id="rId16"/>
+    <p:sldId id="335" r:id="rId17"/>
+    <p:sldId id="326" r:id="rId18"/>
+    <p:sldId id="328" r:id="rId19"/>
+    <p:sldId id="339" r:id="rId20"/>
+    <p:sldId id="340" r:id="rId21"/>
+    <p:sldId id="341" r:id="rId22"/>
+    <p:sldId id="343" r:id="rId23"/>
+    <p:sldId id="329" r:id="rId24"/>
+    <p:sldId id="264" r:id="rId25"/>
   </p:sldIdLst>
   <p:sldSz cx="9144000" cy="5143500" type="screen16x9"/>
   <p:notesSz cx="6858000" cy="9144000"/>
   <p:embeddedFontLst>
     <p:embeddedFont>
-      <p:font typeface="Anaheim" panose="020B0604020202020204" charset="0"/>
-      <p:regular r:id="rId28"/>
+      <p:font typeface="Anaheim" panose="02000503000000000000" pitchFamily="2" charset="77"/>
+      <p:regular r:id="rId27"/>
     </p:embeddedFont>
     <p:embeddedFont>
-      <p:font typeface="Barlow" panose="00000500000000000000" pitchFamily="2" charset="0"/>
-      <p:regular r:id="rId29"/>
-      <p:bold r:id="rId30"/>
-      <p:italic r:id="rId31"/>
-      <p:boldItalic r:id="rId32"/>
+      <p:font typeface="Barlow" pitchFamily="2" charset="77"/>
+      <p:regular r:id="rId28"/>
+      <p:bold r:id="rId29"/>
+      <p:italic r:id="rId30"/>
+      <p:boldItalic r:id="rId31"/>
     </p:embeddedFont>
     <p:embeddedFont>
-      <p:font typeface="Nunito Light" pitchFamily="2" charset="0"/>
-      <p:regular r:id="rId33"/>
-      <p:italic r:id="rId34"/>
+      <p:font typeface="Nunito Light" panose="020F0302020204030204" pitchFamily="34" charset="0"/>
+      <p:regular r:id="rId32"/>
+      <p:italic r:id="rId33"/>
     </p:embeddedFont>
     <p:embeddedFont>
-      <p:font typeface="Poppins" panose="00000500000000000000" pitchFamily="2" charset="0"/>
-      <p:regular r:id="rId35"/>
-      <p:bold r:id="rId36"/>
-      <p:italic r:id="rId37"/>
-      <p:boldItalic r:id="rId38"/>
+      <p:font typeface="Poppins" pitchFamily="2" charset="77"/>
+      <p:regular r:id="rId34"/>
+      <p:bold r:id="rId35"/>
+      <p:italic r:id="rId36"/>
+      <p:boldItalic r:id="rId37"/>
     </p:embeddedFont>
     <p:embeddedFont>
-      <p:font typeface="Poppins Black" panose="00000A00000000000000" pitchFamily="2" charset="0"/>
-      <p:bold r:id="rId39"/>
+      <p:font typeface="Poppins Black" panose="020B0604020202020204" pitchFamily="34" charset="0"/>
+      <p:bold r:id="rId38"/>
+      <p:italic r:id="rId39"/>
       <p:boldItalic r:id="rId40"/>
     </p:embeddedFont>
     <p:embeddedFont>
-      <p:font typeface="Poppins ExtraBold" panose="00000900000000000000" pitchFamily="2" charset="0"/>
+      <p:font typeface="Poppins ExtraBold" panose="020B0604020202020204" pitchFamily="34" charset="0"/>
       <p:bold r:id="rId41"/>
-      <p:boldItalic r:id="rId42"/>
+      <p:italic r:id="rId42"/>
+      <p:boldItalic r:id="rId43"/>
     </p:embeddedFont>
     <p:embeddedFont>
-      <p:font typeface="Raleway" pitchFamily="2" charset="0"/>
-      <p:regular r:id="rId43"/>
-      <p:bold r:id="rId44"/>
-      <p:italic r:id="rId45"/>
-      <p:boldItalic r:id="rId46"/>
+      <p:font typeface="Raleway" pitchFamily="2" charset="77"/>
+      <p:regular r:id="rId44"/>
+      <p:bold r:id="rId45"/>
+      <p:italic r:id="rId46"/>
+      <p:boldItalic r:id="rId47"/>
     </p:embeddedFont>
   </p:embeddedFontLst>
   <p:defaultTextStyle>
@@ -970,7 +971,7 @@
     </p:spTree>
     <p:extLst>
       <p:ext uri="{BB962C8B-B14F-4D97-AF65-F5344CB8AC3E}">
-        <p14:creationId xmlns:p14="http://schemas.microsoft.com/office/powerpoint/2010/main" val="1288191075"/>
+        <p14:creationId xmlns:p14="http://schemas.microsoft.com/office/powerpoint/2010/main" val="693861038"/>
       </p:ext>
     </p:extLst>
   </p:cSld>
@@ -981,6 +982,115 @@
 </file>
 
 <file path=ppt/notesSlides/notesSlide11.xml><?xml version="1.0" encoding="utf-8"?>
+<p:notes xmlns:a="http://schemas.openxmlformats.org/drawingml/2006/main" xmlns:r="http://schemas.openxmlformats.org/officeDocument/2006/relationships" xmlns:p="http://schemas.openxmlformats.org/presentationml/2006/main" showMasterSp="0" showMasterPhAnim="0">
+  <p:cSld>
+    <p:spTree>
+      <p:nvGrpSpPr>
+        <p:cNvPr id="1" name="Shape 910"/>
+        <p:cNvGrpSpPr/>
+        <p:nvPr/>
+      </p:nvGrpSpPr>
+      <p:grpSpPr>
+        <a:xfrm>
+          <a:off x="0" y="0"/>
+          <a:ext cx="0" cy="0"/>
+          <a:chOff x="0" y="0"/>
+          <a:chExt cx="0" cy="0"/>
+        </a:xfrm>
+      </p:grpSpPr>
+      <p:sp>
+        <p:nvSpPr>
+          <p:cNvPr id="911" name="Google Shape;911;g54dda1946d_6_308:notes"/>
+          <p:cNvSpPr>
+            <a:spLocks noGrp="1" noRot="1" noChangeAspect="1"/>
+          </p:cNvSpPr>
+          <p:nvPr>
+            <p:ph type="sldImg" idx="2"/>
+          </p:nvPr>
+        </p:nvSpPr>
+        <p:spPr>
+          <a:xfrm>
+            <a:off x="381000" y="685800"/>
+            <a:ext cx="6096000" cy="3429000"/>
+          </a:xfrm>
+          <a:custGeom>
+            <a:avLst/>
+            <a:gdLst/>
+            <a:ahLst/>
+            <a:cxnLst/>
+            <a:rect l="l" t="t" r="r" b="b"/>
+            <a:pathLst>
+              <a:path w="120000" h="120000" extrusionOk="0">
+                <a:moveTo>
+                  <a:pt x="0" y="0"/>
+                </a:moveTo>
+                <a:lnTo>
+                  <a:pt x="120000" y="0"/>
+                </a:lnTo>
+                <a:lnTo>
+                  <a:pt x="120000" y="120000"/>
+                </a:lnTo>
+                <a:lnTo>
+                  <a:pt x="0" y="120000"/>
+                </a:lnTo>
+                <a:close/>
+              </a:path>
+            </a:pathLst>
+          </a:custGeom>
+        </p:spPr>
+      </p:sp>
+      <p:sp>
+        <p:nvSpPr>
+          <p:cNvPr id="912" name="Google Shape;912;g54dda1946d_6_308:notes"/>
+          <p:cNvSpPr txBox="1">
+            <a:spLocks noGrp="1"/>
+          </p:cNvSpPr>
+          <p:nvPr>
+            <p:ph type="body" idx="1"/>
+          </p:nvPr>
+        </p:nvSpPr>
+        <p:spPr>
+          <a:xfrm>
+            <a:off x="685800" y="4343400"/>
+            <a:ext cx="5486400" cy="4114800"/>
+          </a:xfrm>
+          <a:prstGeom prst="rect">
+            <a:avLst/>
+          </a:prstGeom>
+        </p:spPr>
+        <p:txBody>
+          <a:bodyPr spcFirstLastPara="1" wrap="square" lIns="91425" tIns="91425" rIns="91425" bIns="91425" anchor="t" anchorCtr="0">
+            <a:noAutofit/>
+          </a:bodyPr>
+          <a:lstStyle/>
+          <a:p>
+            <a:pPr marL="0" lvl="0" indent="0" algn="l" rtl="0">
+              <a:spcBef>
+                <a:spcPts val="0"/>
+              </a:spcBef>
+              <a:spcAft>
+                <a:spcPts val="0"/>
+              </a:spcAft>
+              <a:buNone/>
+            </a:pPr>
+            <a:endParaRPr/>
+          </a:p>
+        </p:txBody>
+      </p:sp>
+    </p:spTree>
+    <p:extLst>
+      <p:ext uri="{BB962C8B-B14F-4D97-AF65-F5344CB8AC3E}">
+        <p14:creationId xmlns:p14="http://schemas.microsoft.com/office/powerpoint/2010/main" val="4279683576"/>
+      </p:ext>
+    </p:extLst>
+  </p:cSld>
+  <p:clrMapOvr>
+    <a:masterClrMapping/>
+  </p:clrMapOvr>
+</p:notes>
+</file>
+
+<file path=ppt/notesSlides/notesSlide12.xml><?xml version="1.0" encoding="utf-8"?>
 <p:notes xmlns:a="http://schemas.openxmlformats.org/drawingml/2006/main" xmlns:r="http://schemas.openxmlformats.org/officeDocument/2006/relationships" xmlns:p="http://schemas.openxmlformats.org/presentationml/2006/main" showMasterSp="0" showMasterPhAnim="0">
   <p:cSld>
     <p:spTree>
@@ -1079,116 +1189,7 @@
     </p:spTree>
     <p:extLst>
       <p:ext uri="{BB962C8B-B14F-4D97-AF65-F5344CB8AC3E}">
-        <p14:creationId xmlns:p14="http://schemas.microsoft.com/office/powerpoint/2010/main" val="693861038"/>
-      </p:ext>
-    </p:extLst>
-  </p:cSld>
-  <p:clrMapOvr>
-    <a:masterClrMapping/>
-  </p:clrMapOvr>
-</p:notes>
-</file>
-
-<file path=ppt/notesSlides/notesSlide12.xml><?xml version="1.0" encoding="utf-8"?>
-<p:notes xmlns:a="http://schemas.openxmlformats.org/drawingml/2006/main" xmlns:r="http://schemas.openxmlformats.org/officeDocument/2006/relationships" xmlns:p="http://schemas.openxmlformats.org/presentationml/2006/main" showMasterSp="0" showMasterPhAnim="0">
-  <p:cSld>
-    <p:spTree>
-      <p:nvGrpSpPr>
-        <p:cNvPr id="1" name="Shape 910"/>
-        <p:cNvGrpSpPr/>
-        <p:nvPr/>
-      </p:nvGrpSpPr>
-      <p:grpSpPr>
-        <a:xfrm>
-          <a:off x="0" y="0"/>
-          <a:ext cx="0" cy="0"/>
-          <a:chOff x="0" y="0"/>
-          <a:chExt cx="0" cy="0"/>
-        </a:xfrm>
-      </p:grpSpPr>
-      <p:sp>
-        <p:nvSpPr>
-          <p:cNvPr id="911" name="Google Shape;911;g54dda1946d_6_308:notes"/>
-          <p:cNvSpPr>
-            <a:spLocks noGrp="1" noRot="1" noChangeAspect="1"/>
-          </p:cNvSpPr>
-          <p:nvPr>
-            <p:ph type="sldImg" idx="2"/>
-          </p:nvPr>
-        </p:nvSpPr>
-        <p:spPr>
-          <a:xfrm>
-            <a:off x="381000" y="685800"/>
-            <a:ext cx="6096000" cy="3429000"/>
-          </a:xfrm>
-          <a:custGeom>
-            <a:avLst/>
-            <a:gdLst/>
-            <a:ahLst/>
-            <a:cxnLst/>
-            <a:rect l="l" t="t" r="r" b="b"/>
-            <a:pathLst>
-              <a:path w="120000" h="120000" extrusionOk="0">
-                <a:moveTo>
-                  <a:pt x="0" y="0"/>
-                </a:moveTo>
-                <a:lnTo>
-                  <a:pt x="120000" y="0"/>
-                </a:lnTo>
-                <a:lnTo>
-                  <a:pt x="120000" y="120000"/>
-                </a:lnTo>
-                <a:lnTo>
-                  <a:pt x="0" y="120000"/>
-                </a:lnTo>
-                <a:close/>
-              </a:path>
-            </a:pathLst>
-          </a:custGeom>
-        </p:spPr>
-      </p:sp>
-      <p:sp>
-        <p:nvSpPr>
-          <p:cNvPr id="912" name="Google Shape;912;g54dda1946d_6_308:notes"/>
-          <p:cNvSpPr txBox="1">
-            <a:spLocks noGrp="1"/>
-          </p:cNvSpPr>
-          <p:nvPr>
-            <p:ph type="body" idx="1"/>
-          </p:nvPr>
-        </p:nvSpPr>
-        <p:spPr>
-          <a:xfrm>
-            <a:off x="685800" y="4343400"/>
-            <a:ext cx="5486400" cy="4114800"/>
-          </a:xfrm>
-          <a:prstGeom prst="rect">
-            <a:avLst/>
-          </a:prstGeom>
-        </p:spPr>
-        <p:txBody>
-          <a:bodyPr spcFirstLastPara="1" wrap="square" lIns="91425" tIns="91425" rIns="91425" bIns="91425" anchor="t" anchorCtr="0">
-            <a:noAutofit/>
-          </a:bodyPr>
-          <a:lstStyle/>
-          <a:p>
-            <a:pPr marL="0" lvl="0" indent="0" algn="l" rtl="0">
-              <a:spcBef>
-                <a:spcPts val="0"/>
-              </a:spcBef>
-              <a:spcAft>
-                <a:spcPts val="0"/>
-              </a:spcAft>
-              <a:buNone/>
-            </a:pPr>
-            <a:endParaRPr/>
-          </a:p>
-        </p:txBody>
-      </p:sp>
-    </p:spTree>
-    <p:extLst>
-      <p:ext uri="{BB962C8B-B14F-4D97-AF65-F5344CB8AC3E}">
-        <p14:creationId xmlns:p14="http://schemas.microsoft.com/office/powerpoint/2010/main" val="4279683576"/>
+        <p14:creationId xmlns:p14="http://schemas.microsoft.com/office/powerpoint/2010/main" val="967060452"/>
       </p:ext>
     </p:extLst>
   </p:cSld>
@@ -1297,7 +1298,7 @@
     </p:spTree>
     <p:extLst>
       <p:ext uri="{BB962C8B-B14F-4D97-AF65-F5344CB8AC3E}">
-        <p14:creationId xmlns:p14="http://schemas.microsoft.com/office/powerpoint/2010/main" val="967060452"/>
+        <p14:creationId xmlns:p14="http://schemas.microsoft.com/office/powerpoint/2010/main" val="3594058429"/>
       </p:ext>
     </p:extLst>
   </p:cSld>
@@ -1406,7 +1407,7 @@
     </p:spTree>
     <p:extLst>
       <p:ext uri="{BB962C8B-B14F-4D97-AF65-F5344CB8AC3E}">
-        <p14:creationId xmlns:p14="http://schemas.microsoft.com/office/powerpoint/2010/main" val="3594058429"/>
+        <p14:creationId xmlns:p14="http://schemas.microsoft.com/office/powerpoint/2010/main" val="4193478892"/>
       </p:ext>
     </p:extLst>
   </p:cSld>
@@ -1515,7 +1516,7 @@
     </p:spTree>
     <p:extLst>
       <p:ext uri="{BB962C8B-B14F-4D97-AF65-F5344CB8AC3E}">
-        <p14:creationId xmlns:p14="http://schemas.microsoft.com/office/powerpoint/2010/main" val="4193478892"/>
+        <p14:creationId xmlns:p14="http://schemas.microsoft.com/office/powerpoint/2010/main" val="2873642396"/>
       </p:ext>
     </p:extLst>
   </p:cSld>
@@ -1526,6 +1527,115 @@
 </file>
 
 <file path=ppt/notesSlides/notesSlide16.xml><?xml version="1.0" encoding="utf-8"?>
+<p:notes xmlns:a="http://schemas.openxmlformats.org/drawingml/2006/main" xmlns:r="http://schemas.openxmlformats.org/officeDocument/2006/relationships" xmlns:p="http://schemas.openxmlformats.org/presentationml/2006/main" showMasterSp="0" showMasterPhAnim="0">
+  <p:cSld>
+    <p:spTree>
+      <p:nvGrpSpPr>
+        <p:cNvPr id="1" name="Shape 910"/>
+        <p:cNvGrpSpPr/>
+        <p:nvPr/>
+      </p:nvGrpSpPr>
+      <p:grpSpPr>
+        <a:xfrm>
+          <a:off x="0" y="0"/>
+          <a:ext cx="0" cy="0"/>
+          <a:chOff x="0" y="0"/>
+          <a:chExt cx="0" cy="0"/>
+        </a:xfrm>
+      </p:grpSpPr>
+      <p:sp>
+        <p:nvSpPr>
+          <p:cNvPr id="911" name="Google Shape;911;g54dda1946d_6_308:notes"/>
+          <p:cNvSpPr>
+            <a:spLocks noGrp="1" noRot="1" noChangeAspect="1"/>
+          </p:cNvSpPr>
+          <p:nvPr>
+            <p:ph type="sldImg" idx="2"/>
+          </p:nvPr>
+        </p:nvSpPr>
+        <p:spPr>
+          <a:xfrm>
+            <a:off x="381000" y="685800"/>
+            <a:ext cx="6096000" cy="3429000"/>
+          </a:xfrm>
+          <a:custGeom>
+            <a:avLst/>
+            <a:gdLst/>
+            <a:ahLst/>
+            <a:cxnLst/>
+            <a:rect l="l" t="t" r="r" b="b"/>
+            <a:pathLst>
+              <a:path w="120000" h="120000" extrusionOk="0">
+                <a:moveTo>
+                  <a:pt x="0" y="0"/>
+                </a:moveTo>
+                <a:lnTo>
+                  <a:pt x="120000" y="0"/>
+                </a:lnTo>
+                <a:lnTo>
+                  <a:pt x="120000" y="120000"/>
+                </a:lnTo>
+                <a:lnTo>
+                  <a:pt x="0" y="120000"/>
+                </a:lnTo>
+                <a:close/>
+              </a:path>
+            </a:pathLst>
+          </a:custGeom>
+        </p:spPr>
+      </p:sp>
+      <p:sp>
+        <p:nvSpPr>
+          <p:cNvPr id="912" name="Google Shape;912;g54dda1946d_6_308:notes"/>
+          <p:cNvSpPr txBox="1">
+            <a:spLocks noGrp="1"/>
+          </p:cNvSpPr>
+          <p:nvPr>
+            <p:ph type="body" idx="1"/>
+          </p:nvPr>
+        </p:nvSpPr>
+        <p:spPr>
+          <a:xfrm>
+            <a:off x="685800" y="4343400"/>
+            <a:ext cx="5486400" cy="4114800"/>
+          </a:xfrm>
+          <a:prstGeom prst="rect">
+            <a:avLst/>
+          </a:prstGeom>
+        </p:spPr>
+        <p:txBody>
+          <a:bodyPr spcFirstLastPara="1" wrap="square" lIns="91425" tIns="91425" rIns="91425" bIns="91425" anchor="t" anchorCtr="0">
+            <a:noAutofit/>
+          </a:bodyPr>
+          <a:lstStyle/>
+          <a:p>
+            <a:pPr marL="0" lvl="0" indent="0" algn="l" rtl="0">
+              <a:spcBef>
+                <a:spcPts val="0"/>
+              </a:spcBef>
+              <a:spcAft>
+                <a:spcPts val="0"/>
+              </a:spcAft>
+              <a:buNone/>
+            </a:pPr>
+            <a:endParaRPr/>
+          </a:p>
+        </p:txBody>
+      </p:sp>
+    </p:spTree>
+    <p:extLst>
+      <p:ext uri="{BB962C8B-B14F-4D97-AF65-F5344CB8AC3E}">
+        <p14:creationId xmlns:p14="http://schemas.microsoft.com/office/powerpoint/2010/main" val="161449577"/>
+      </p:ext>
+    </p:extLst>
+  </p:cSld>
+  <p:clrMapOvr>
+    <a:masterClrMapping/>
+  </p:clrMapOvr>
+</p:notes>
+</file>
+
+<file path=ppt/notesSlides/notesSlide17.xml><?xml version="1.0" encoding="utf-8"?>
 <p:notes xmlns:a="http://schemas.openxmlformats.org/drawingml/2006/main" xmlns:r="http://schemas.openxmlformats.org/officeDocument/2006/relationships" xmlns:p="http://schemas.openxmlformats.org/presentationml/2006/main" showMasterSp="0" showMasterPhAnim="0">
   <p:cSld>
     <p:spTree>
@@ -1617,14 +1727,14 @@
               </a:spcAft>
               <a:buNone/>
             </a:pPr>
-            <a:endParaRPr/>
+            <a:endParaRPr dirty="0"/>
           </a:p>
         </p:txBody>
       </p:sp>
     </p:spTree>
     <p:extLst>
       <p:ext uri="{BB962C8B-B14F-4D97-AF65-F5344CB8AC3E}">
-        <p14:creationId xmlns:p14="http://schemas.microsoft.com/office/powerpoint/2010/main" val="2873642396"/>
+        <p14:creationId xmlns:p14="http://schemas.microsoft.com/office/powerpoint/2010/main" val="466738972"/>
       </p:ext>
     </p:extLst>
   </p:cSld>
@@ -1634,7 +1744,7 @@
 </p:notes>
 </file>
 
-<file path=ppt/notesSlides/notesSlide17.xml><?xml version="1.0" encoding="utf-8"?>
+<file path=ppt/notesSlides/notesSlide18.xml><?xml version="1.0" encoding="utf-8"?>
 <p:notes xmlns:a="http://schemas.openxmlformats.org/drawingml/2006/main" xmlns:r="http://schemas.openxmlformats.org/officeDocument/2006/relationships" xmlns:p="http://schemas.openxmlformats.org/presentationml/2006/main" showMasterSp="0" showMasterPhAnim="0">
   <p:cSld>
     <p:spTree>
@@ -1733,7 +1843,7 @@
     </p:spTree>
     <p:extLst>
       <p:ext uri="{BB962C8B-B14F-4D97-AF65-F5344CB8AC3E}">
-        <p14:creationId xmlns:p14="http://schemas.microsoft.com/office/powerpoint/2010/main" val="161449577"/>
+        <p14:creationId xmlns:p14="http://schemas.microsoft.com/office/powerpoint/2010/main" val="1749947200"/>
       </p:ext>
     </p:extLst>
   </p:cSld>
@@ -1743,12 +1853,12 @@
 </p:notes>
 </file>
 
-<file path=ppt/notesSlides/notesSlide18.xml><?xml version="1.0" encoding="utf-8"?>
+<file path=ppt/notesSlides/notesSlide19.xml><?xml version="1.0" encoding="utf-8"?>
 <p:notes xmlns:a="http://schemas.openxmlformats.org/drawingml/2006/main" xmlns:r="http://schemas.openxmlformats.org/officeDocument/2006/relationships" xmlns:p="http://schemas.openxmlformats.org/presentationml/2006/main" showMasterSp="0" showMasterPhAnim="0">
   <p:cSld>
     <p:spTree>
       <p:nvGrpSpPr>
-        <p:cNvPr id="1" name="Shape 942"/>
+        <p:cNvPr id="1" name="Shape 962"/>
         <p:cNvGrpSpPr/>
         <p:nvPr/>
       </p:nvGrpSpPr>
@@ -1762,7 +1872,7 @@
       </p:grpSpPr>
       <p:sp>
         <p:nvSpPr>
-          <p:cNvPr id="943" name="Google Shape;943;g54dda1946d_6_322:notes"/>
+          <p:cNvPr id="963" name="Google Shape;963;g54dda1946d_6_344:notes"/>
           <p:cNvSpPr>
             <a:spLocks noGrp="1" noRot="1" noChangeAspect="1"/>
           </p:cNvSpPr>
@@ -1803,7 +1913,7 @@
       </p:sp>
       <p:sp>
         <p:nvSpPr>
-          <p:cNvPr id="944" name="Google Shape;944;g54dda1946d_6_322:notes"/>
+          <p:cNvPr id="964" name="Google Shape;964;g54dda1946d_6_344:notes"/>
           <p:cNvSpPr txBox="1">
             <a:spLocks noGrp="1"/>
           </p:cNvSpPr>
@@ -1835,125 +1945,11 @@
               </a:spcAft>
               <a:buNone/>
             </a:pPr>
-            <a:endParaRPr dirty="0"/>
-          </a:p>
-        </p:txBody>
-      </p:sp>
-    </p:spTree>
-    <p:extLst>
-      <p:ext uri="{BB962C8B-B14F-4D97-AF65-F5344CB8AC3E}">
-        <p14:creationId xmlns:p14="http://schemas.microsoft.com/office/powerpoint/2010/main" val="466738972"/>
-      </p:ext>
-    </p:extLst>
-  </p:cSld>
-  <p:clrMapOvr>
-    <a:masterClrMapping/>
-  </p:clrMapOvr>
-</p:notes>
-</file>
-
-<file path=ppt/notesSlides/notesSlide19.xml><?xml version="1.0" encoding="utf-8"?>
-<p:notes xmlns:a="http://schemas.openxmlformats.org/drawingml/2006/main" xmlns:r="http://schemas.openxmlformats.org/officeDocument/2006/relationships" xmlns:p="http://schemas.openxmlformats.org/presentationml/2006/main" showMasterSp="0" showMasterPhAnim="0">
-  <p:cSld>
-    <p:spTree>
-      <p:nvGrpSpPr>
-        <p:cNvPr id="1" name="Shape 910"/>
-        <p:cNvGrpSpPr/>
-        <p:nvPr/>
-      </p:nvGrpSpPr>
-      <p:grpSpPr>
-        <a:xfrm>
-          <a:off x="0" y="0"/>
-          <a:ext cx="0" cy="0"/>
-          <a:chOff x="0" y="0"/>
-          <a:chExt cx="0" cy="0"/>
-        </a:xfrm>
-      </p:grpSpPr>
-      <p:sp>
-        <p:nvSpPr>
-          <p:cNvPr id="911" name="Google Shape;911;g54dda1946d_6_308:notes"/>
-          <p:cNvSpPr>
-            <a:spLocks noGrp="1" noRot="1" noChangeAspect="1"/>
-          </p:cNvSpPr>
-          <p:nvPr>
-            <p:ph type="sldImg" idx="2"/>
-          </p:nvPr>
-        </p:nvSpPr>
-        <p:spPr>
-          <a:xfrm>
-            <a:off x="381000" y="685800"/>
-            <a:ext cx="6096000" cy="3429000"/>
-          </a:xfrm>
-          <a:custGeom>
-            <a:avLst/>
-            <a:gdLst/>
-            <a:ahLst/>
-            <a:cxnLst/>
-            <a:rect l="l" t="t" r="r" b="b"/>
-            <a:pathLst>
-              <a:path w="120000" h="120000" extrusionOk="0">
-                <a:moveTo>
-                  <a:pt x="0" y="0"/>
-                </a:moveTo>
-                <a:lnTo>
-                  <a:pt x="120000" y="0"/>
-                </a:lnTo>
-                <a:lnTo>
-                  <a:pt x="120000" y="120000"/>
-                </a:lnTo>
-                <a:lnTo>
-                  <a:pt x="0" y="120000"/>
-                </a:lnTo>
-                <a:close/>
-              </a:path>
-            </a:pathLst>
-          </a:custGeom>
-        </p:spPr>
-      </p:sp>
-      <p:sp>
-        <p:nvSpPr>
-          <p:cNvPr id="912" name="Google Shape;912;g54dda1946d_6_308:notes"/>
-          <p:cNvSpPr txBox="1">
-            <a:spLocks noGrp="1"/>
-          </p:cNvSpPr>
-          <p:nvPr>
-            <p:ph type="body" idx="1"/>
-          </p:nvPr>
-        </p:nvSpPr>
-        <p:spPr>
-          <a:xfrm>
-            <a:off x="685800" y="4343400"/>
-            <a:ext cx="5486400" cy="4114800"/>
-          </a:xfrm>
-          <a:prstGeom prst="rect">
-            <a:avLst/>
-          </a:prstGeom>
-        </p:spPr>
-        <p:txBody>
-          <a:bodyPr spcFirstLastPara="1" wrap="square" lIns="91425" tIns="91425" rIns="91425" bIns="91425" anchor="t" anchorCtr="0">
-            <a:noAutofit/>
-          </a:bodyPr>
-          <a:lstStyle/>
-          <a:p>
-            <a:pPr marL="0" lvl="0" indent="0" algn="l" rtl="0">
-              <a:spcBef>
-                <a:spcPts val="0"/>
-              </a:spcBef>
-              <a:spcAft>
-                <a:spcPts val="0"/>
-              </a:spcAft>
-              <a:buNone/>
-            </a:pPr>
             <a:endParaRPr/>
           </a:p>
         </p:txBody>
       </p:sp>
     </p:spTree>
-    <p:extLst>
-      <p:ext uri="{BB962C8B-B14F-4D97-AF65-F5344CB8AC3E}">
-        <p14:creationId xmlns:p14="http://schemas.microsoft.com/office/powerpoint/2010/main" val="1749947200"/>
-      </p:ext>
-    </p:extLst>
   </p:cSld>
   <p:clrMapOvr>
     <a:masterClrMapping/>
@@ -2068,110 +2064,6 @@
               <a:sym typeface="Anaheim"/>
             </a:endParaRPr>
           </a:p>
-          <a:p>
-            <a:pPr marL="0" lvl="0" indent="0" algn="l" rtl="0">
-              <a:spcBef>
-                <a:spcPts val="0"/>
-              </a:spcBef>
-              <a:spcAft>
-                <a:spcPts val="0"/>
-              </a:spcAft>
-              <a:buNone/>
-            </a:pPr>
-            <a:endParaRPr/>
-          </a:p>
-        </p:txBody>
-      </p:sp>
-    </p:spTree>
-  </p:cSld>
-  <p:clrMapOvr>
-    <a:masterClrMapping/>
-  </p:clrMapOvr>
-</p:notes>
-</file>
-
-<file path=ppt/notesSlides/notesSlide20.xml><?xml version="1.0" encoding="utf-8"?>
-<p:notes xmlns:a="http://schemas.openxmlformats.org/drawingml/2006/main" xmlns:r="http://schemas.openxmlformats.org/officeDocument/2006/relationships" xmlns:p="http://schemas.openxmlformats.org/presentationml/2006/main" showMasterSp="0" showMasterPhAnim="0">
-  <p:cSld>
-    <p:spTree>
-      <p:nvGrpSpPr>
-        <p:cNvPr id="1" name="Shape 962"/>
-        <p:cNvGrpSpPr/>
-        <p:nvPr/>
-      </p:nvGrpSpPr>
-      <p:grpSpPr>
-        <a:xfrm>
-          <a:off x="0" y="0"/>
-          <a:ext cx="0" cy="0"/>
-          <a:chOff x="0" y="0"/>
-          <a:chExt cx="0" cy="0"/>
-        </a:xfrm>
-      </p:grpSpPr>
-      <p:sp>
-        <p:nvSpPr>
-          <p:cNvPr id="963" name="Google Shape;963;g54dda1946d_6_344:notes"/>
-          <p:cNvSpPr>
-            <a:spLocks noGrp="1" noRot="1" noChangeAspect="1"/>
-          </p:cNvSpPr>
-          <p:nvPr>
-            <p:ph type="sldImg" idx="2"/>
-          </p:nvPr>
-        </p:nvSpPr>
-        <p:spPr>
-          <a:xfrm>
-            <a:off x="381000" y="685800"/>
-            <a:ext cx="6096000" cy="3429000"/>
-          </a:xfrm>
-          <a:custGeom>
-            <a:avLst/>
-            <a:gdLst/>
-            <a:ahLst/>
-            <a:cxnLst/>
-            <a:rect l="l" t="t" r="r" b="b"/>
-            <a:pathLst>
-              <a:path w="120000" h="120000" extrusionOk="0">
-                <a:moveTo>
-                  <a:pt x="0" y="0"/>
-                </a:moveTo>
-                <a:lnTo>
-                  <a:pt x="120000" y="0"/>
-                </a:lnTo>
-                <a:lnTo>
-                  <a:pt x="120000" y="120000"/>
-                </a:lnTo>
-                <a:lnTo>
-                  <a:pt x="0" y="120000"/>
-                </a:lnTo>
-                <a:close/>
-              </a:path>
-            </a:pathLst>
-          </a:custGeom>
-        </p:spPr>
-      </p:sp>
-      <p:sp>
-        <p:nvSpPr>
-          <p:cNvPr id="964" name="Google Shape;964;g54dda1946d_6_344:notes"/>
-          <p:cNvSpPr txBox="1">
-            <a:spLocks noGrp="1"/>
-          </p:cNvSpPr>
-          <p:nvPr>
-            <p:ph type="body" idx="1"/>
-          </p:nvPr>
-        </p:nvSpPr>
-        <p:spPr>
-          <a:xfrm>
-            <a:off x="685800" y="4343400"/>
-            <a:ext cx="5486400" cy="4114800"/>
-          </a:xfrm>
-          <a:prstGeom prst="rect">
-            <a:avLst/>
-          </a:prstGeom>
-        </p:spPr>
-        <p:txBody>
-          <a:bodyPr spcFirstLastPara="1" wrap="square" lIns="91425" tIns="91425" rIns="91425" bIns="91425" anchor="t" anchorCtr="0">
-            <a:noAutofit/>
-          </a:bodyPr>
-          <a:lstStyle/>
           <a:p>
             <a:pPr marL="0" lvl="0" indent="0" algn="l" rtl="0">
               <a:spcBef>
@@ -2395,110 +2287,6 @@
         </p:txBody>
       </p:sp>
     </p:spTree>
-  </p:cSld>
-  <p:clrMapOvr>
-    <a:masterClrMapping/>
-  </p:clrMapOvr>
-</p:notes>
-</file>
-
-<file path=ppt/notesSlides/notesSlide5.xml><?xml version="1.0" encoding="utf-8"?>
-<p:notes xmlns:a="http://schemas.openxmlformats.org/drawingml/2006/main" xmlns:r="http://schemas.openxmlformats.org/officeDocument/2006/relationships" xmlns:p="http://schemas.openxmlformats.org/presentationml/2006/main" showMasterSp="0" showMasterPhAnim="0">
-  <p:cSld>
-    <p:spTree>
-      <p:nvGrpSpPr>
-        <p:cNvPr id="1" name="Shape 935"/>
-        <p:cNvGrpSpPr/>
-        <p:nvPr/>
-      </p:nvGrpSpPr>
-      <p:grpSpPr>
-        <a:xfrm>
-          <a:off x="0" y="0"/>
-          <a:ext cx="0" cy="0"/>
-          <a:chOff x="0" y="0"/>
-          <a:chExt cx="0" cy="0"/>
-        </a:xfrm>
-      </p:grpSpPr>
-      <p:sp>
-        <p:nvSpPr>
-          <p:cNvPr id="936" name="Google Shape;936;g14072739ea5_12_0:notes"/>
-          <p:cNvSpPr>
-            <a:spLocks noGrp="1" noRot="1" noChangeAspect="1"/>
-          </p:cNvSpPr>
-          <p:nvPr>
-            <p:ph type="sldImg" idx="2"/>
-          </p:nvPr>
-        </p:nvSpPr>
-        <p:spPr>
-          <a:xfrm>
-            <a:off x="381000" y="685800"/>
-            <a:ext cx="6096000" cy="3429000"/>
-          </a:xfrm>
-          <a:custGeom>
-            <a:avLst/>
-            <a:gdLst/>
-            <a:ahLst/>
-            <a:cxnLst/>
-            <a:rect l="l" t="t" r="r" b="b"/>
-            <a:pathLst>
-              <a:path w="120000" h="120000" extrusionOk="0">
-                <a:moveTo>
-                  <a:pt x="0" y="0"/>
-                </a:moveTo>
-                <a:lnTo>
-                  <a:pt x="120000" y="0"/>
-                </a:lnTo>
-                <a:lnTo>
-                  <a:pt x="120000" y="120000"/>
-                </a:lnTo>
-                <a:lnTo>
-                  <a:pt x="0" y="120000"/>
-                </a:lnTo>
-                <a:close/>
-              </a:path>
-            </a:pathLst>
-          </a:custGeom>
-        </p:spPr>
-      </p:sp>
-      <p:sp>
-        <p:nvSpPr>
-          <p:cNvPr id="937" name="Google Shape;937;g14072739ea5_12_0:notes"/>
-          <p:cNvSpPr txBox="1">
-            <a:spLocks noGrp="1"/>
-          </p:cNvSpPr>
-          <p:nvPr>
-            <p:ph type="body" idx="1"/>
-          </p:nvPr>
-        </p:nvSpPr>
-        <p:spPr>
-          <a:xfrm>
-            <a:off x="685800" y="4343400"/>
-            <a:ext cx="5486400" cy="4114800"/>
-          </a:xfrm>
-          <a:prstGeom prst="rect">
-            <a:avLst/>
-          </a:prstGeom>
-        </p:spPr>
-        <p:txBody>
-          <a:bodyPr spcFirstLastPara="1" wrap="square" lIns="91425" tIns="91425" rIns="91425" bIns="91425" anchor="t" anchorCtr="0">
-            <a:noAutofit/>
-          </a:bodyPr>
-          <a:lstStyle/>
-          <a:p>
-            <a:pPr marL="0" lvl="0" indent="0" algn="l" rtl="0">
-              <a:spcBef>
-                <a:spcPts val="0"/>
-              </a:spcBef>
-              <a:spcAft>
-                <a:spcPts val="0"/>
-              </a:spcAft>
-              <a:buNone/>
-            </a:pPr>
-            <a:endParaRPr/>
-          </a:p>
-        </p:txBody>
-      </p:sp>
-    </p:spTree>
     <p:extLst>
       <p:ext uri="{BB962C8B-B14F-4D97-AF65-F5344CB8AC3E}">
         <p14:creationId xmlns:p14="http://schemas.microsoft.com/office/powerpoint/2010/main" val="3016009520"/>
@@ -2511,7 +2299,7 @@
 </p:notes>
 </file>
 
-<file path=ppt/notesSlides/notesSlide6.xml><?xml version="1.0" encoding="utf-8"?>
+<file path=ppt/notesSlides/notesSlide5.xml><?xml version="1.0" encoding="utf-8"?>
 <p:notes xmlns:a="http://schemas.openxmlformats.org/drawingml/2006/main" xmlns:r="http://schemas.openxmlformats.org/officeDocument/2006/relationships" xmlns:p="http://schemas.openxmlformats.org/presentationml/2006/main" showMasterSp="0" showMasterPhAnim="0">
   <p:cSld>
     <p:spTree>
@@ -2620,7 +2408,7 @@
 </p:notes>
 </file>
 
-<file path=ppt/notesSlides/notesSlide7.xml><?xml version="1.0" encoding="utf-8"?>
+<file path=ppt/notesSlides/notesSlide6.xml><?xml version="1.0" encoding="utf-8"?>
 <p:notes xmlns:a="http://schemas.openxmlformats.org/drawingml/2006/main" xmlns:r="http://schemas.openxmlformats.org/officeDocument/2006/relationships" xmlns:p="http://schemas.openxmlformats.org/presentationml/2006/main" showMasterSp="0" showMasterPhAnim="0">
   <p:cSld>
     <p:spTree>
@@ -2729,7 +2517,7 @@
 </p:notes>
 </file>
 
-<file path=ppt/notesSlides/notesSlide8.xml><?xml version="1.0" encoding="utf-8"?>
+<file path=ppt/notesSlides/notesSlide7.xml><?xml version="1.0" encoding="utf-8"?>
 <p:notes xmlns:a="http://schemas.openxmlformats.org/drawingml/2006/main" xmlns:r="http://schemas.openxmlformats.org/officeDocument/2006/relationships" xmlns:p="http://schemas.openxmlformats.org/presentationml/2006/main" showMasterSp="0" showMasterPhAnim="0">
   <p:cSld>
     <p:spTree>
@@ -2829,6 +2617,115 @@
     <p:extLst>
       <p:ext uri="{BB962C8B-B14F-4D97-AF65-F5344CB8AC3E}">
         <p14:creationId xmlns:p14="http://schemas.microsoft.com/office/powerpoint/2010/main" val="1251448205"/>
+      </p:ext>
+    </p:extLst>
+  </p:cSld>
+  <p:clrMapOvr>
+    <a:masterClrMapping/>
+  </p:clrMapOvr>
+</p:notes>
+</file>
+
+<file path=ppt/notesSlides/notesSlide8.xml><?xml version="1.0" encoding="utf-8"?>
+<p:notes xmlns:a="http://schemas.openxmlformats.org/drawingml/2006/main" xmlns:r="http://schemas.openxmlformats.org/officeDocument/2006/relationships" xmlns:p="http://schemas.openxmlformats.org/presentationml/2006/main" showMasterSp="0" showMasterPhAnim="0">
+  <p:cSld>
+    <p:spTree>
+      <p:nvGrpSpPr>
+        <p:cNvPr id="1" name="Shape 942"/>
+        <p:cNvGrpSpPr/>
+        <p:nvPr/>
+      </p:nvGrpSpPr>
+      <p:grpSpPr>
+        <a:xfrm>
+          <a:off x="0" y="0"/>
+          <a:ext cx="0" cy="0"/>
+          <a:chOff x="0" y="0"/>
+          <a:chExt cx="0" cy="0"/>
+        </a:xfrm>
+      </p:grpSpPr>
+      <p:sp>
+        <p:nvSpPr>
+          <p:cNvPr id="943" name="Google Shape;943;g54dda1946d_6_322:notes"/>
+          <p:cNvSpPr>
+            <a:spLocks noGrp="1" noRot="1" noChangeAspect="1"/>
+          </p:cNvSpPr>
+          <p:nvPr>
+            <p:ph type="sldImg" idx="2"/>
+          </p:nvPr>
+        </p:nvSpPr>
+        <p:spPr>
+          <a:xfrm>
+            <a:off x="381000" y="685800"/>
+            <a:ext cx="6096000" cy="3429000"/>
+          </a:xfrm>
+          <a:custGeom>
+            <a:avLst/>
+            <a:gdLst/>
+            <a:ahLst/>
+            <a:cxnLst/>
+            <a:rect l="l" t="t" r="r" b="b"/>
+            <a:pathLst>
+              <a:path w="120000" h="120000" extrusionOk="0">
+                <a:moveTo>
+                  <a:pt x="0" y="0"/>
+                </a:moveTo>
+                <a:lnTo>
+                  <a:pt x="120000" y="0"/>
+                </a:lnTo>
+                <a:lnTo>
+                  <a:pt x="120000" y="120000"/>
+                </a:lnTo>
+                <a:lnTo>
+                  <a:pt x="0" y="120000"/>
+                </a:lnTo>
+                <a:close/>
+              </a:path>
+            </a:pathLst>
+          </a:custGeom>
+        </p:spPr>
+      </p:sp>
+      <p:sp>
+        <p:nvSpPr>
+          <p:cNvPr id="944" name="Google Shape;944;g54dda1946d_6_322:notes"/>
+          <p:cNvSpPr txBox="1">
+            <a:spLocks noGrp="1"/>
+          </p:cNvSpPr>
+          <p:nvPr>
+            <p:ph type="body" idx="1"/>
+          </p:nvPr>
+        </p:nvSpPr>
+        <p:spPr>
+          <a:xfrm>
+            <a:off x="685800" y="4343400"/>
+            <a:ext cx="5486400" cy="4114800"/>
+          </a:xfrm>
+          <a:prstGeom prst="rect">
+            <a:avLst/>
+          </a:prstGeom>
+        </p:spPr>
+        <p:txBody>
+          <a:bodyPr spcFirstLastPara="1" wrap="square" lIns="91425" tIns="91425" rIns="91425" bIns="91425" anchor="t" anchorCtr="0">
+            <a:noAutofit/>
+          </a:bodyPr>
+          <a:lstStyle/>
+          <a:p>
+            <a:pPr marL="0" lvl="0" indent="0" algn="l" rtl="0">
+              <a:spcBef>
+                <a:spcPts val="0"/>
+              </a:spcBef>
+              <a:spcAft>
+                <a:spcPts val="0"/>
+              </a:spcAft>
+              <a:buNone/>
+            </a:pPr>
+            <a:endParaRPr/>
+          </a:p>
+        </p:txBody>
+      </p:sp>
+    </p:spTree>
+    <p:extLst>
+      <p:ext uri="{BB962C8B-B14F-4D97-AF65-F5344CB8AC3E}">
+        <p14:creationId xmlns:p14="http://schemas.microsoft.com/office/powerpoint/2010/main" val="4198409820"/>
       </p:ext>
     </p:extLst>
   </p:cSld>
@@ -2937,7 +2834,7 @@
     </p:spTree>
     <p:extLst>
       <p:ext uri="{BB962C8B-B14F-4D97-AF65-F5344CB8AC3E}">
-        <p14:creationId xmlns:p14="http://schemas.microsoft.com/office/powerpoint/2010/main" val="4198409820"/>
+        <p14:creationId xmlns:p14="http://schemas.microsoft.com/office/powerpoint/2010/main" val="1288191075"/>
       </p:ext>
     </p:extLst>
   </p:cSld>
@@ -16215,6 +16112,13 @@
                 <a:tailEnd type="none" w="med" len="med"/>
               </a:ln>
             </p:spPr>
+            <p:txBody>
+              <a:bodyPr/>
+              <a:lstStyle/>
+              <a:p>
+                <a:endParaRPr lang="es-ES_tradnl"/>
+              </a:p>
+            </p:txBody>
           </p:sp>
           <p:sp>
             <p:nvSpPr>
@@ -16320,6 +16224,13 @@
                 <a:tailEnd type="none" w="med" len="med"/>
               </a:ln>
             </p:spPr>
+            <p:txBody>
+              <a:bodyPr/>
+              <a:lstStyle/>
+              <a:p>
+                <a:endParaRPr lang="es-ES_tradnl"/>
+              </a:p>
+            </p:txBody>
           </p:sp>
           <p:sp>
             <p:nvSpPr>
@@ -16610,6 +16521,13 @@
                 <a:tailEnd type="none" w="med" len="med"/>
               </a:ln>
             </p:spPr>
+            <p:txBody>
+              <a:bodyPr/>
+              <a:lstStyle/>
+              <a:p>
+                <a:endParaRPr lang="es-ES_tradnl"/>
+              </a:p>
+            </p:txBody>
           </p:sp>
           <p:sp>
             <p:nvSpPr>
@@ -16715,6 +16633,13 @@
                 <a:tailEnd type="none" w="med" len="med"/>
               </a:ln>
             </p:spPr>
+            <p:txBody>
+              <a:bodyPr/>
+              <a:lstStyle/>
+              <a:p>
+                <a:endParaRPr lang="es-ES_tradnl"/>
+              </a:p>
+            </p:txBody>
           </p:sp>
           <p:sp>
             <p:nvSpPr>
@@ -16820,6 +16745,13 @@
                 <a:tailEnd type="none" w="med" len="med"/>
               </a:ln>
             </p:spPr>
+            <p:txBody>
+              <a:bodyPr/>
+              <a:lstStyle/>
+              <a:p>
+                <a:endParaRPr lang="es-ES_tradnl"/>
+              </a:p>
+            </p:txBody>
           </p:sp>
           <p:sp>
             <p:nvSpPr>
@@ -16925,6 +16857,13 @@
                 <a:tailEnd type="none" w="med" len="med"/>
               </a:ln>
             </p:spPr>
+            <p:txBody>
+              <a:bodyPr/>
+              <a:lstStyle/>
+              <a:p>
+                <a:endParaRPr lang="es-ES_tradnl"/>
+              </a:p>
+            </p:txBody>
           </p:sp>
           <p:sp>
             <p:nvSpPr>
@@ -17066,865 +17005,6 @@
 </file>
 
 <file path=ppt/slides/slide10.xml><?xml version="1.0" encoding="utf-8"?>
-<p:sld xmlns:a="http://schemas.openxmlformats.org/drawingml/2006/main" xmlns:r="http://schemas.openxmlformats.org/officeDocument/2006/relationships" xmlns:p="http://schemas.openxmlformats.org/presentationml/2006/main">
-  <p:cSld>
-    <p:bg>
-      <p:bgPr>
-        <a:solidFill>
-          <a:schemeClr val="accent6"/>
-        </a:solidFill>
-        <a:effectLst/>
-      </p:bgPr>
-    </p:bg>
-    <p:spTree>
-      <p:nvGrpSpPr>
-        <p:cNvPr id="1" name="Shape 945"/>
-        <p:cNvGrpSpPr/>
-        <p:nvPr/>
-      </p:nvGrpSpPr>
-      <p:grpSpPr>
-        <a:xfrm>
-          <a:off x="0" y="0"/>
-          <a:ext cx="0" cy="0"/>
-          <a:chOff x="0" y="0"/>
-          <a:chExt cx="0" cy="0"/>
-        </a:xfrm>
-      </p:grpSpPr>
-      <p:sp>
-        <p:nvSpPr>
-          <p:cNvPr id="11" name="Rectángulo 10">
-            <a:extLst>
-              <a:ext uri="{FF2B5EF4-FFF2-40B4-BE49-F238E27FC236}">
-                <a16:creationId xmlns:a16="http://schemas.microsoft.com/office/drawing/2014/main" id="{FD023D06-7B51-48F8-A393-FDF2764FF17A}"/>
-              </a:ext>
-            </a:extLst>
-          </p:cNvPr>
-          <p:cNvSpPr/>
-          <p:nvPr/>
-        </p:nvSpPr>
-        <p:spPr>
-          <a:xfrm>
-            <a:off x="11151" y="3869473"/>
-            <a:ext cx="3668751" cy="1262876"/>
-          </a:xfrm>
-          <a:prstGeom prst="rect">
-            <a:avLst/>
-          </a:prstGeom>
-          <a:solidFill>
-            <a:schemeClr val="accent6"/>
-          </a:solidFill>
-          <a:ln>
-            <a:solidFill>
-              <a:schemeClr val="accent6"/>
-            </a:solidFill>
-          </a:ln>
-        </p:spPr>
-        <p:style>
-          <a:lnRef idx="2">
-            <a:schemeClr val="accent1">
-              <a:shade val="50000"/>
-            </a:schemeClr>
-          </a:lnRef>
-          <a:fillRef idx="1">
-            <a:schemeClr val="accent1"/>
-          </a:fillRef>
-          <a:effectRef idx="0">
-            <a:schemeClr val="accent1"/>
-          </a:effectRef>
-          <a:fontRef idx="minor">
-            <a:schemeClr val="lt1"/>
-          </a:fontRef>
-        </p:style>
-        <p:txBody>
-          <a:bodyPr rtlCol="0" anchor="ctr"/>
-          <a:lstStyle/>
-          <a:p>
-            <a:pPr algn="ctr"/>
-            <a:endParaRPr lang="es-CO"/>
-          </a:p>
-        </p:txBody>
-      </p:sp>
-      <p:sp>
-        <p:nvSpPr>
-          <p:cNvPr id="946" name="Google Shape;946;p42"/>
-          <p:cNvSpPr txBox="1">
-            <a:spLocks noGrp="1"/>
-          </p:cNvSpPr>
-          <p:nvPr>
-            <p:ph type="title"/>
-          </p:nvPr>
-        </p:nvSpPr>
-        <p:spPr>
-          <a:xfrm>
-            <a:off x="720000" y="445025"/>
-            <a:ext cx="7710900" cy="572700"/>
-          </a:xfrm>
-          <a:prstGeom prst="rect">
-            <a:avLst/>
-          </a:prstGeom>
-        </p:spPr>
-        <p:txBody>
-          <a:bodyPr spcFirstLastPara="1" wrap="square" lIns="91425" tIns="91425" rIns="91425" bIns="91425" anchor="t" anchorCtr="0">
-            <a:noAutofit/>
-          </a:bodyPr>
-          <a:lstStyle/>
-          <a:p>
-            <a:pPr marL="0" lvl="0" indent="0" algn="ctr" rtl="0">
-              <a:spcBef>
-                <a:spcPts val="0"/>
-              </a:spcBef>
-              <a:spcAft>
-                <a:spcPts val="0"/>
-              </a:spcAft>
-              <a:buNone/>
-            </a:pPr>
-            <a:r>
-              <a:rPr lang="en" dirty="0"/>
-              <a:t>VISUALIZACIÓN 1</a:t>
-            </a:r>
-            <a:endParaRPr dirty="0"/>
-          </a:p>
-        </p:txBody>
-      </p:sp>
-      <p:sp>
-        <p:nvSpPr>
-          <p:cNvPr id="2" name="CuadroTexto 1">
-            <a:extLst>
-              <a:ext uri="{FF2B5EF4-FFF2-40B4-BE49-F238E27FC236}">
-                <a16:creationId xmlns:a16="http://schemas.microsoft.com/office/drawing/2014/main" id="{1C6A3ACD-BE1A-47AF-9D12-61C40D00DB55}"/>
-              </a:ext>
-            </a:extLst>
-          </p:cNvPr>
-          <p:cNvSpPr txBox="1"/>
-          <p:nvPr/>
-        </p:nvSpPr>
-        <p:spPr>
-          <a:xfrm>
-            <a:off x="5695510" y="1478730"/>
-            <a:ext cx="3290949" cy="2987356"/>
-          </a:xfrm>
-          <a:prstGeom prst="rect">
-            <a:avLst/>
-          </a:prstGeom>
-          <a:noFill/>
-        </p:spPr>
-        <p:txBody>
-          <a:bodyPr wrap="square" rtlCol="0">
-            <a:spAutoFit/>
-          </a:bodyPr>
-          <a:lstStyle/>
-          <a:p>
-            <a:pPr marL="285750" indent="-285750" algn="just">
-              <a:lnSpc>
-                <a:spcPts val="1900"/>
-              </a:lnSpc>
-              <a:buFont typeface="Arial" panose="020B0604020202020204" pitchFamily="34" charset="0"/>
-              <a:buChar char="•"/>
-            </a:pPr>
-            <a:r>
-              <a:rPr lang="es-MX" sz="1250" dirty="0">
-                <a:solidFill>
-                  <a:schemeClr val="tx1"/>
-                </a:solidFill>
-                <a:latin typeface="Barlow" panose="00000500000000000000" pitchFamily="2" charset="0"/>
-              </a:rPr>
-              <a:t>Tanto en colegios bilingües como no bilingües, la </a:t>
-            </a:r>
-            <a:r>
-              <a:rPr lang="es-MX" sz="1250" dirty="0">
-                <a:solidFill>
-                  <a:schemeClr val="accent1"/>
-                </a:solidFill>
-                <a:latin typeface="Barlow" panose="00000500000000000000" pitchFamily="2" charset="0"/>
-              </a:rPr>
-              <a:t>mayoría de estudiantes </a:t>
-            </a:r>
-            <a:r>
-              <a:rPr lang="es-MX" sz="1250" dirty="0">
-                <a:solidFill>
-                  <a:schemeClr val="tx1"/>
-                </a:solidFill>
-                <a:latin typeface="Barlow" panose="00000500000000000000" pitchFamily="2" charset="0"/>
-              </a:rPr>
-              <a:t>se encuentran en el </a:t>
-            </a:r>
-            <a:r>
-              <a:rPr lang="es-MX" sz="1250" b="1" dirty="0">
-                <a:solidFill>
-                  <a:schemeClr val="tx1"/>
-                </a:solidFill>
-                <a:latin typeface="Barlow" panose="00000500000000000000" pitchFamily="2" charset="0"/>
-              </a:rPr>
-              <a:t>rango 3</a:t>
-            </a:r>
-            <a:r>
-              <a:rPr lang="es-MX" sz="1250" dirty="0">
-                <a:solidFill>
-                  <a:schemeClr val="tx1"/>
-                </a:solidFill>
-                <a:latin typeface="Barlow" panose="00000500000000000000" pitchFamily="2" charset="0"/>
-              </a:rPr>
-              <a:t>.</a:t>
-            </a:r>
-          </a:p>
-          <a:p>
-            <a:pPr marL="285750" indent="-285750" algn="just">
-              <a:lnSpc>
-                <a:spcPts val="1900"/>
-              </a:lnSpc>
-              <a:buFont typeface="Arial" panose="020B0604020202020204" pitchFamily="34" charset="0"/>
-              <a:buChar char="•"/>
-            </a:pPr>
-            <a:endParaRPr lang="es-MX" sz="1250" dirty="0">
-              <a:solidFill>
-                <a:schemeClr val="tx1"/>
-              </a:solidFill>
-              <a:latin typeface="Barlow" panose="00000500000000000000" pitchFamily="2" charset="0"/>
-            </a:endParaRPr>
-          </a:p>
-          <a:p>
-            <a:pPr marL="285750" indent="-285750" algn="just">
-              <a:lnSpc>
-                <a:spcPts val="1900"/>
-              </a:lnSpc>
-              <a:buFont typeface="Arial" panose="020B0604020202020204" pitchFamily="34" charset="0"/>
-              <a:buChar char="•"/>
-            </a:pPr>
-            <a:r>
-              <a:rPr lang="es-MX" sz="1250" dirty="0">
-                <a:solidFill>
-                  <a:schemeClr val="tx1"/>
-                </a:solidFill>
-                <a:latin typeface="Barlow" panose="00000500000000000000" pitchFamily="2" charset="0"/>
-              </a:rPr>
-              <a:t>En los </a:t>
-            </a:r>
-            <a:r>
-              <a:rPr lang="es-MX" sz="1250" b="1" dirty="0">
-                <a:solidFill>
-                  <a:schemeClr val="tx1"/>
-                </a:solidFill>
-                <a:latin typeface="Barlow" panose="00000500000000000000" pitchFamily="2" charset="0"/>
-              </a:rPr>
-              <a:t>colegios bilingües</a:t>
-            </a:r>
-            <a:r>
-              <a:rPr lang="es-MX" sz="1250" dirty="0">
-                <a:solidFill>
-                  <a:schemeClr val="tx1"/>
-                </a:solidFill>
-                <a:latin typeface="Barlow" panose="00000500000000000000" pitchFamily="2" charset="0"/>
-              </a:rPr>
-              <a:t>, la cantidad de estudiantes es </a:t>
-            </a:r>
-            <a:r>
-              <a:rPr lang="es-MX" sz="1250" dirty="0">
-                <a:solidFill>
-                  <a:schemeClr val="accent1"/>
-                </a:solidFill>
-                <a:latin typeface="Barlow" panose="00000500000000000000" pitchFamily="2" charset="0"/>
-              </a:rPr>
-              <a:t>menor</a:t>
-            </a:r>
-            <a:r>
-              <a:rPr lang="es-MX" sz="1250" dirty="0">
-                <a:solidFill>
-                  <a:schemeClr val="tx1"/>
-                </a:solidFill>
-                <a:latin typeface="Barlow" panose="00000500000000000000" pitchFamily="2" charset="0"/>
-              </a:rPr>
-              <a:t> en comparación con los </a:t>
-            </a:r>
-            <a:r>
-              <a:rPr lang="es-MX" sz="1250" b="1" dirty="0">
-                <a:solidFill>
-                  <a:schemeClr val="tx1"/>
-                </a:solidFill>
-                <a:latin typeface="Barlow" panose="00000500000000000000" pitchFamily="2" charset="0"/>
-              </a:rPr>
-              <a:t>no bilingües</a:t>
-            </a:r>
-            <a:r>
-              <a:rPr lang="es-MX" sz="1250" dirty="0">
-                <a:solidFill>
-                  <a:schemeClr val="tx1"/>
-                </a:solidFill>
-                <a:latin typeface="Barlow" panose="00000500000000000000" pitchFamily="2" charset="0"/>
-              </a:rPr>
-              <a:t>.</a:t>
-            </a:r>
-          </a:p>
-          <a:p>
-            <a:pPr marL="285750" indent="-285750" algn="just">
-              <a:lnSpc>
-                <a:spcPts val="1900"/>
-              </a:lnSpc>
-              <a:buFont typeface="Arial" panose="020B0604020202020204" pitchFamily="34" charset="0"/>
-              <a:buChar char="•"/>
-            </a:pPr>
-            <a:endParaRPr lang="es-MX" sz="1250" dirty="0">
-              <a:solidFill>
-                <a:schemeClr val="tx1"/>
-              </a:solidFill>
-              <a:latin typeface="Barlow" panose="00000500000000000000" pitchFamily="2" charset="0"/>
-            </a:endParaRPr>
-          </a:p>
-          <a:p>
-            <a:pPr marL="285750" indent="-285750" algn="just">
-              <a:lnSpc>
-                <a:spcPts val="1900"/>
-              </a:lnSpc>
-              <a:buFont typeface="Arial" panose="020B0604020202020204" pitchFamily="34" charset="0"/>
-              <a:buChar char="•"/>
-            </a:pPr>
-            <a:r>
-              <a:rPr lang="es-MX" sz="1250" dirty="0">
-                <a:solidFill>
-                  <a:schemeClr val="tx1"/>
-                </a:solidFill>
-                <a:latin typeface="Barlow" panose="00000500000000000000" pitchFamily="2" charset="0"/>
-              </a:rPr>
-              <a:t>En el rango de </a:t>
-            </a:r>
-            <a:r>
-              <a:rPr lang="es-MX" sz="1250" b="1" dirty="0">
-                <a:solidFill>
-                  <a:schemeClr val="tx1"/>
-                </a:solidFill>
-                <a:latin typeface="Barlow" panose="00000500000000000000" pitchFamily="2" charset="0"/>
-              </a:rPr>
-              <a:t>puntaje 1</a:t>
-            </a:r>
-            <a:r>
-              <a:rPr lang="es-MX" sz="1250" dirty="0">
-                <a:solidFill>
-                  <a:schemeClr val="tx1"/>
-                </a:solidFill>
-                <a:latin typeface="Barlow" panose="00000500000000000000" pitchFamily="2" charset="0"/>
-              </a:rPr>
-              <a:t>, la cantidad de estudiantes en colegios no bilingües es </a:t>
-            </a:r>
-            <a:r>
-              <a:rPr lang="es-MX" sz="1250" dirty="0">
-                <a:solidFill>
-                  <a:schemeClr val="accent1"/>
-                </a:solidFill>
-                <a:latin typeface="Barlow" panose="00000500000000000000" pitchFamily="2" charset="0"/>
-              </a:rPr>
-              <a:t>mayor</a:t>
-            </a:r>
-            <a:r>
-              <a:rPr lang="es-MX" sz="1250" dirty="0">
-                <a:solidFill>
-                  <a:schemeClr val="tx1"/>
-                </a:solidFill>
-                <a:latin typeface="Barlow" panose="00000500000000000000" pitchFamily="2" charset="0"/>
-              </a:rPr>
-              <a:t> que en colegios bilingües.</a:t>
-            </a:r>
-          </a:p>
-          <a:p>
-            <a:pPr marL="285750" indent="-285750" algn="just">
-              <a:lnSpc>
-                <a:spcPts val="1900"/>
-              </a:lnSpc>
-              <a:buFont typeface="Arial" panose="020B0604020202020204" pitchFamily="34" charset="0"/>
-              <a:buChar char="•"/>
-            </a:pPr>
-            <a:endParaRPr lang="es-MX" sz="1250" b="0" i="0" dirty="0">
-              <a:solidFill>
-                <a:schemeClr val="tx1"/>
-              </a:solidFill>
-              <a:effectLst/>
-              <a:latin typeface="Barlow" panose="00000500000000000000" pitchFamily="2" charset="0"/>
-            </a:endParaRPr>
-          </a:p>
-        </p:txBody>
-      </p:sp>
-      <p:pic>
-        <p:nvPicPr>
-          <p:cNvPr id="4" name="Imagen 3">
-            <a:extLst>
-              <a:ext uri="{FF2B5EF4-FFF2-40B4-BE49-F238E27FC236}">
-                <a16:creationId xmlns:a16="http://schemas.microsoft.com/office/drawing/2014/main" id="{5143755C-2361-4283-8A27-0F45365D8887}"/>
-              </a:ext>
-            </a:extLst>
-          </p:cNvPr>
-          <p:cNvPicPr>
-            <a:picLocks noChangeAspect="1"/>
-          </p:cNvPicPr>
-          <p:nvPr/>
-        </p:nvPicPr>
-        <p:blipFill>
-          <a:blip r:embed="rId3"/>
-          <a:stretch>
-            <a:fillRect/>
-          </a:stretch>
-        </p:blipFill>
-        <p:spPr>
-          <a:xfrm>
-            <a:off x="302491" y="1456914"/>
-            <a:ext cx="5161609" cy="3241561"/>
-          </a:xfrm>
-          <a:prstGeom prst="rect">
-            <a:avLst/>
-          </a:prstGeom>
-        </p:spPr>
-      </p:pic>
-      <p:sp>
-        <p:nvSpPr>
-          <p:cNvPr id="9" name="CuadroTexto 8">
-            <a:extLst>
-              <a:ext uri="{FF2B5EF4-FFF2-40B4-BE49-F238E27FC236}">
-                <a16:creationId xmlns:a16="http://schemas.microsoft.com/office/drawing/2014/main" id="{83B261D8-06C1-407A-A5A6-226625200F2C}"/>
-              </a:ext>
-            </a:extLst>
-          </p:cNvPr>
-          <p:cNvSpPr txBox="1"/>
-          <p:nvPr/>
-        </p:nvSpPr>
-        <p:spPr>
-          <a:xfrm>
-            <a:off x="1282262" y="3616767"/>
-            <a:ext cx="325821" cy="215444"/>
-          </a:xfrm>
-          <a:prstGeom prst="rect">
-            <a:avLst/>
-          </a:prstGeom>
-          <a:noFill/>
-        </p:spPr>
-        <p:txBody>
-          <a:bodyPr wrap="square" rtlCol="0">
-            <a:spAutoFit/>
-          </a:bodyPr>
-          <a:lstStyle/>
-          <a:p>
-            <a:pPr algn="ctr"/>
-            <a:r>
-              <a:rPr lang="es-CO" sz="800" b="1" dirty="0">
-                <a:latin typeface="Barlow" panose="00000500000000000000" pitchFamily="2" charset="0"/>
-              </a:rPr>
-              <a:t>22</a:t>
-            </a:r>
-          </a:p>
-        </p:txBody>
-      </p:sp>
-      <p:sp>
-        <p:nvSpPr>
-          <p:cNvPr id="21" name="CuadroTexto 20">
-            <a:extLst>
-              <a:ext uri="{FF2B5EF4-FFF2-40B4-BE49-F238E27FC236}">
-                <a16:creationId xmlns:a16="http://schemas.microsoft.com/office/drawing/2014/main" id="{2C0FF0A0-7173-415E-BCAB-BE7FFEF22F54}"/>
-              </a:ext>
-            </a:extLst>
-          </p:cNvPr>
-          <p:cNvSpPr txBox="1"/>
-          <p:nvPr/>
-        </p:nvSpPr>
-        <p:spPr>
-          <a:xfrm>
-            <a:off x="1608083" y="1570539"/>
-            <a:ext cx="564098" cy="215444"/>
-          </a:xfrm>
-          <a:prstGeom prst="rect">
-            <a:avLst/>
-          </a:prstGeom>
-          <a:noFill/>
-        </p:spPr>
-        <p:txBody>
-          <a:bodyPr wrap="square" rtlCol="0">
-            <a:spAutoFit/>
-          </a:bodyPr>
-          <a:lstStyle/>
-          <a:p>
-            <a:pPr algn="ctr"/>
-            <a:r>
-              <a:rPr lang="es-CO" sz="800" b="1" dirty="0">
-                <a:latin typeface="Barlow" panose="00000500000000000000" pitchFamily="2" charset="0"/>
-              </a:rPr>
-              <a:t>13355</a:t>
-            </a:r>
-          </a:p>
-        </p:txBody>
-      </p:sp>
-      <p:sp>
-        <p:nvSpPr>
-          <p:cNvPr id="22" name="CuadroTexto 21">
-            <a:extLst>
-              <a:ext uri="{FF2B5EF4-FFF2-40B4-BE49-F238E27FC236}">
-                <a16:creationId xmlns:a16="http://schemas.microsoft.com/office/drawing/2014/main" id="{B149CC05-0B31-4890-BBA1-F4A0CB65591A}"/>
-              </a:ext>
-            </a:extLst>
-          </p:cNvPr>
-          <p:cNvSpPr txBox="1"/>
-          <p:nvPr/>
-        </p:nvSpPr>
-        <p:spPr>
-          <a:xfrm>
-            <a:off x="1403134" y="1769841"/>
-            <a:ext cx="504494" cy="215444"/>
-          </a:xfrm>
-          <a:prstGeom prst="rect">
-            <a:avLst/>
-          </a:prstGeom>
-          <a:noFill/>
-        </p:spPr>
-        <p:txBody>
-          <a:bodyPr wrap="square" rtlCol="0">
-            <a:spAutoFit/>
-          </a:bodyPr>
-          <a:lstStyle/>
-          <a:p>
-            <a:pPr algn="ctr"/>
-            <a:r>
-              <a:rPr lang="es-CO" sz="800" b="1" dirty="0">
-                <a:latin typeface="Barlow" panose="00000500000000000000" pitchFamily="2" charset="0"/>
-              </a:rPr>
-              <a:t>7443</a:t>
-            </a:r>
-          </a:p>
-        </p:txBody>
-      </p:sp>
-      <p:sp>
-        <p:nvSpPr>
-          <p:cNvPr id="23" name="CuadroTexto 22">
-            <a:extLst>
-              <a:ext uri="{FF2B5EF4-FFF2-40B4-BE49-F238E27FC236}">
-                <a16:creationId xmlns:a16="http://schemas.microsoft.com/office/drawing/2014/main" id="{A5217E27-6E54-491C-A7D9-4CED5813B059}"/>
-              </a:ext>
-            </a:extLst>
-          </p:cNvPr>
-          <p:cNvSpPr txBox="1"/>
-          <p:nvPr/>
-        </p:nvSpPr>
-        <p:spPr>
-          <a:xfrm>
-            <a:off x="1907873" y="1948123"/>
-            <a:ext cx="462454" cy="215444"/>
-          </a:xfrm>
-          <a:prstGeom prst="rect">
-            <a:avLst/>
-          </a:prstGeom>
-          <a:noFill/>
-        </p:spPr>
-        <p:txBody>
-          <a:bodyPr wrap="square" rtlCol="0">
-            <a:spAutoFit/>
-          </a:bodyPr>
-          <a:lstStyle/>
-          <a:p>
-            <a:pPr algn="ctr"/>
-            <a:r>
-              <a:rPr lang="es-CO" sz="800" b="1" dirty="0">
-                <a:latin typeface="Barlow" panose="00000500000000000000" pitchFamily="2" charset="0"/>
-              </a:rPr>
-              <a:t>4012</a:t>
-            </a:r>
-          </a:p>
-        </p:txBody>
-      </p:sp>
-      <p:sp>
-        <p:nvSpPr>
-          <p:cNvPr id="26" name="CuadroTexto 25">
-            <a:extLst>
-              <a:ext uri="{FF2B5EF4-FFF2-40B4-BE49-F238E27FC236}">
-                <a16:creationId xmlns:a16="http://schemas.microsoft.com/office/drawing/2014/main" id="{6808A1A5-99A3-411B-84C7-B892701BE04F}"/>
-              </a:ext>
-            </a:extLst>
-          </p:cNvPr>
-          <p:cNvSpPr txBox="1"/>
-          <p:nvPr/>
-        </p:nvSpPr>
-        <p:spPr>
-          <a:xfrm>
-            <a:off x="2125129" y="2830167"/>
-            <a:ext cx="462454" cy="215444"/>
-          </a:xfrm>
-          <a:prstGeom prst="rect">
-            <a:avLst/>
-          </a:prstGeom>
-          <a:noFill/>
-        </p:spPr>
-        <p:txBody>
-          <a:bodyPr wrap="square" rtlCol="0">
-            <a:spAutoFit/>
-          </a:bodyPr>
-          <a:lstStyle/>
-          <a:p>
-            <a:pPr algn="ctr"/>
-            <a:r>
-              <a:rPr lang="es-CO" sz="800" b="1" dirty="0">
-                <a:latin typeface="Barlow" panose="00000500000000000000" pitchFamily="2" charset="0"/>
-              </a:rPr>
-              <a:t>251</a:t>
-            </a:r>
-          </a:p>
-        </p:txBody>
-      </p:sp>
-      <p:sp>
-        <p:nvSpPr>
-          <p:cNvPr id="27" name="CuadroTexto 26">
-            <a:extLst>
-              <a:ext uri="{FF2B5EF4-FFF2-40B4-BE49-F238E27FC236}">
-                <a16:creationId xmlns:a16="http://schemas.microsoft.com/office/drawing/2014/main" id="{F647514D-9451-46D4-BF86-1460867AF911}"/>
-              </a:ext>
-            </a:extLst>
-          </p:cNvPr>
-          <p:cNvSpPr txBox="1"/>
-          <p:nvPr/>
-        </p:nvSpPr>
-        <p:spPr>
-          <a:xfrm>
-            <a:off x="3501408" y="4017881"/>
-            <a:ext cx="462454" cy="215444"/>
-          </a:xfrm>
-          <a:prstGeom prst="rect">
-            <a:avLst/>
-          </a:prstGeom>
-          <a:noFill/>
-        </p:spPr>
-        <p:txBody>
-          <a:bodyPr wrap="square" rtlCol="0">
-            <a:spAutoFit/>
-          </a:bodyPr>
-          <a:lstStyle/>
-          <a:p>
-            <a:pPr algn="ctr"/>
-            <a:r>
-              <a:rPr lang="es-CO" sz="800" b="1" dirty="0">
-                <a:latin typeface="Barlow" panose="00000500000000000000" pitchFamily="2" charset="0"/>
-              </a:rPr>
-              <a:t>6</a:t>
-            </a:r>
-          </a:p>
-        </p:txBody>
-      </p:sp>
-      <p:sp>
-        <p:nvSpPr>
-          <p:cNvPr id="28" name="CuadroTexto 27">
-            <a:extLst>
-              <a:ext uri="{FF2B5EF4-FFF2-40B4-BE49-F238E27FC236}">
-                <a16:creationId xmlns:a16="http://schemas.microsoft.com/office/drawing/2014/main" id="{DD14246C-3EEB-4FE3-8C2E-60FFF5D27FAD}"/>
-              </a:ext>
-            </a:extLst>
-          </p:cNvPr>
-          <p:cNvSpPr txBox="1"/>
-          <p:nvPr/>
-        </p:nvSpPr>
-        <p:spPr>
-          <a:xfrm>
-            <a:off x="3732635" y="2933478"/>
-            <a:ext cx="462454" cy="215444"/>
-          </a:xfrm>
-          <a:prstGeom prst="rect">
-            <a:avLst/>
-          </a:prstGeom>
-          <a:noFill/>
-        </p:spPr>
-        <p:txBody>
-          <a:bodyPr wrap="square" rtlCol="0">
-            <a:spAutoFit/>
-          </a:bodyPr>
-          <a:lstStyle/>
-          <a:p>
-            <a:pPr algn="ctr"/>
-            <a:r>
-              <a:rPr lang="es-CO" sz="800" b="1" dirty="0">
-                <a:latin typeface="Barlow" panose="00000500000000000000" pitchFamily="2" charset="0"/>
-              </a:rPr>
-              <a:t>188</a:t>
-            </a:r>
-          </a:p>
-        </p:txBody>
-      </p:sp>
-      <p:sp>
-        <p:nvSpPr>
-          <p:cNvPr id="29" name="CuadroTexto 28">
-            <a:extLst>
-              <a:ext uri="{FF2B5EF4-FFF2-40B4-BE49-F238E27FC236}">
-                <a16:creationId xmlns:a16="http://schemas.microsoft.com/office/drawing/2014/main" id="{FDD6DE9C-F466-4E56-B9F2-F3178DE13BCD}"/>
-              </a:ext>
-            </a:extLst>
-          </p:cNvPr>
-          <p:cNvSpPr txBox="1"/>
-          <p:nvPr/>
-        </p:nvSpPr>
-        <p:spPr>
-          <a:xfrm>
-            <a:off x="4189835" y="3249725"/>
-            <a:ext cx="462454" cy="215444"/>
-          </a:xfrm>
-          <a:prstGeom prst="rect">
-            <a:avLst/>
-          </a:prstGeom>
-          <a:noFill/>
-        </p:spPr>
-        <p:txBody>
-          <a:bodyPr wrap="square" rtlCol="0">
-            <a:spAutoFit/>
-          </a:bodyPr>
-          <a:lstStyle/>
-          <a:p>
-            <a:pPr algn="ctr"/>
-            <a:r>
-              <a:rPr lang="es-CO" sz="800" b="1" dirty="0">
-                <a:latin typeface="Barlow" panose="00000500000000000000" pitchFamily="2" charset="0"/>
-              </a:rPr>
-              <a:t>70</a:t>
-            </a:r>
-          </a:p>
-        </p:txBody>
-      </p:sp>
-      <p:sp>
-        <p:nvSpPr>
-          <p:cNvPr id="30" name="CuadroTexto 29">
-            <a:extLst>
-              <a:ext uri="{FF2B5EF4-FFF2-40B4-BE49-F238E27FC236}">
-                <a16:creationId xmlns:a16="http://schemas.microsoft.com/office/drawing/2014/main" id="{1BAF8C06-1B86-4379-9B9C-92C1F32D851A}"/>
-              </a:ext>
-            </a:extLst>
-          </p:cNvPr>
-          <p:cNvSpPr txBox="1"/>
-          <p:nvPr/>
-        </p:nvSpPr>
-        <p:spPr>
-          <a:xfrm>
-            <a:off x="3965326" y="2799755"/>
-            <a:ext cx="462454" cy="215444"/>
-          </a:xfrm>
-          <a:prstGeom prst="rect">
-            <a:avLst/>
-          </a:prstGeom>
-          <a:noFill/>
-        </p:spPr>
-        <p:txBody>
-          <a:bodyPr wrap="square" rtlCol="0">
-            <a:spAutoFit/>
-          </a:bodyPr>
-          <a:lstStyle/>
-          <a:p>
-            <a:pPr algn="ctr"/>
-            <a:r>
-              <a:rPr lang="es-CO" sz="800" b="1" dirty="0">
-                <a:latin typeface="Barlow" panose="00000500000000000000" pitchFamily="2" charset="0"/>
-              </a:rPr>
-              <a:t>292</a:t>
-            </a:r>
-          </a:p>
-        </p:txBody>
-      </p:sp>
-      <p:sp>
-        <p:nvSpPr>
-          <p:cNvPr id="31" name="CuadroTexto 30">
-            <a:extLst>
-              <a:ext uri="{FF2B5EF4-FFF2-40B4-BE49-F238E27FC236}">
-                <a16:creationId xmlns:a16="http://schemas.microsoft.com/office/drawing/2014/main" id="{6E1156FD-28DF-481B-9C42-046407B42F4B}"/>
-              </a:ext>
-            </a:extLst>
-          </p:cNvPr>
-          <p:cNvSpPr txBox="1"/>
-          <p:nvPr/>
-        </p:nvSpPr>
-        <p:spPr>
-          <a:xfrm>
-            <a:off x="4413248" y="3830881"/>
-            <a:ext cx="462454" cy="215444"/>
-          </a:xfrm>
-          <a:prstGeom prst="rect">
-            <a:avLst/>
-          </a:prstGeom>
-          <a:noFill/>
-        </p:spPr>
-        <p:txBody>
-          <a:bodyPr wrap="square" rtlCol="0">
-            <a:spAutoFit/>
-          </a:bodyPr>
-          <a:lstStyle/>
-          <a:p>
-            <a:pPr algn="ctr"/>
-            <a:r>
-              <a:rPr lang="es-CO" sz="800" b="1" dirty="0">
-                <a:latin typeface="Barlow" panose="00000500000000000000" pitchFamily="2" charset="0"/>
-              </a:rPr>
-              <a:t>12</a:t>
-            </a:r>
-          </a:p>
-        </p:txBody>
-      </p:sp>
-      <p:pic>
-        <p:nvPicPr>
-          <p:cNvPr id="35" name="Imagen 34">
-            <a:extLst>
-              <a:ext uri="{FF2B5EF4-FFF2-40B4-BE49-F238E27FC236}">
-                <a16:creationId xmlns:a16="http://schemas.microsoft.com/office/drawing/2014/main" id="{A519DE9F-7AA1-49DD-B4D7-56A24DAE2CCC}"/>
-              </a:ext>
-            </a:extLst>
-          </p:cNvPr>
-          <p:cNvPicPr>
-            <a:picLocks noChangeAspect="1"/>
-          </p:cNvPicPr>
-          <p:nvPr/>
-        </p:nvPicPr>
-        <p:blipFill>
-          <a:blip r:embed="rId4"/>
-          <a:stretch>
-            <a:fillRect/>
-          </a:stretch>
-        </p:blipFill>
-        <p:spPr>
-          <a:xfrm>
-            <a:off x="1378320" y="1372919"/>
-            <a:ext cx="3361845" cy="257022"/>
-          </a:xfrm>
-          <a:prstGeom prst="rect">
-            <a:avLst/>
-          </a:prstGeom>
-        </p:spPr>
-      </p:pic>
-      <p:pic>
-        <p:nvPicPr>
-          <p:cNvPr id="33" name="Imagen 32">
-            <a:extLst>
-              <a:ext uri="{FF2B5EF4-FFF2-40B4-BE49-F238E27FC236}">
-                <a16:creationId xmlns:a16="http://schemas.microsoft.com/office/drawing/2014/main" id="{38FA79FA-3C5E-429C-AA80-9D933727DC66}"/>
-              </a:ext>
-            </a:extLst>
-          </p:cNvPr>
-          <p:cNvPicPr>
-            <a:picLocks noChangeAspect="1"/>
-          </p:cNvPicPr>
-          <p:nvPr/>
-        </p:nvPicPr>
-        <p:blipFill>
-          <a:blip r:embed="rId5"/>
-          <a:stretch>
-            <a:fillRect/>
-          </a:stretch>
-        </p:blipFill>
-        <p:spPr>
-          <a:xfrm>
-            <a:off x="1282262" y="1247038"/>
-            <a:ext cx="3932253" cy="235935"/>
-          </a:xfrm>
-          <a:prstGeom prst="rect">
-            <a:avLst/>
-          </a:prstGeom>
-        </p:spPr>
-      </p:pic>
-    </p:spTree>
-    <p:extLst>
-      <p:ext uri="{BB962C8B-B14F-4D97-AF65-F5344CB8AC3E}">
-        <p14:creationId xmlns:p14="http://schemas.microsoft.com/office/powerpoint/2010/main" val="599631490"/>
-      </p:ext>
-    </p:extLst>
-  </p:cSld>
-  <p:clrMapOvr>
-    <a:masterClrMapping/>
-  </p:clrMapOvr>
-</p:sld>
-</file>
-
-<file path=ppt/slides/slide11.xml><?xml version="1.0" encoding="utf-8"?>
 <p:sld xmlns:a="http://schemas.openxmlformats.org/drawingml/2006/main" xmlns:r="http://schemas.openxmlformats.org/officeDocument/2006/relationships" xmlns:p="http://schemas.openxmlformats.org/presentationml/2006/main">
   <p:cSld>
     <p:bg>
@@ -18471,7 +17551,7 @@
 </p:sld>
 </file>
 
-<file path=ppt/slides/slide12.xml><?xml version="1.0" encoding="utf-8"?>
+<file path=ppt/slides/slide11.xml><?xml version="1.0" encoding="utf-8"?>
 <p:sld xmlns:a="http://schemas.openxmlformats.org/drawingml/2006/main" xmlns:r="http://schemas.openxmlformats.org/officeDocument/2006/relationships" xmlns:p="http://schemas.openxmlformats.org/presentationml/2006/main">
   <p:cSld>
     <p:bg>
@@ -19080,7 +18160,7 @@
 </p:sld>
 </file>
 
-<file path=ppt/slides/slide13.xml><?xml version="1.0" encoding="utf-8"?>
+<file path=ppt/slides/slide12.xml><?xml version="1.0" encoding="utf-8"?>
 <p:sld xmlns:a="http://schemas.openxmlformats.org/drawingml/2006/main" xmlns:r="http://schemas.openxmlformats.org/officeDocument/2006/relationships" xmlns:p="http://schemas.openxmlformats.org/presentationml/2006/main">
   <p:cSld>
     <p:spTree>
@@ -19339,6 +18419,13 @@
                 <a:tailEnd type="none" w="med" len="med"/>
               </a:ln>
             </p:spPr>
+            <p:txBody>
+              <a:bodyPr/>
+              <a:lstStyle/>
+              <a:p>
+                <a:endParaRPr lang="es-ES_tradnl"/>
+              </a:p>
+            </p:txBody>
           </p:sp>
           <p:sp>
             <p:nvSpPr>
@@ -19444,6 +18531,13 @@
                 <a:tailEnd type="none" w="med" len="med"/>
               </a:ln>
             </p:spPr>
+            <p:txBody>
+              <a:bodyPr/>
+              <a:lstStyle/>
+              <a:p>
+                <a:endParaRPr lang="es-ES_tradnl"/>
+              </a:p>
+            </p:txBody>
           </p:sp>
           <p:sp>
             <p:nvSpPr>
@@ -19549,6 +18643,13 @@
                 <a:tailEnd type="none" w="med" len="med"/>
               </a:ln>
             </p:spPr>
+            <p:txBody>
+              <a:bodyPr/>
+              <a:lstStyle/>
+              <a:p>
+                <a:endParaRPr lang="es-ES_tradnl"/>
+              </a:p>
+            </p:txBody>
           </p:sp>
           <p:sp>
             <p:nvSpPr>
@@ -19654,6 +18755,13 @@
                 <a:tailEnd type="none" w="med" len="med"/>
               </a:ln>
             </p:spPr>
+            <p:txBody>
+              <a:bodyPr/>
+              <a:lstStyle/>
+              <a:p>
+                <a:endParaRPr lang="es-ES_tradnl"/>
+              </a:p>
+            </p:txBody>
           </p:sp>
           <p:sp>
             <p:nvSpPr>
@@ -19799,7 +18907,7 @@
 </p:sld>
 </file>
 
-<file path=ppt/slides/slide14.xml><?xml version="1.0" encoding="utf-8"?>
+<file path=ppt/slides/slide13.xml><?xml version="1.0" encoding="utf-8"?>
 <p:sld xmlns:a="http://schemas.openxmlformats.org/drawingml/2006/main" xmlns:r="http://schemas.openxmlformats.org/officeDocument/2006/relationships" xmlns:p="http://schemas.openxmlformats.org/presentationml/2006/main">
   <p:cSld>
     <p:bg>
@@ -20019,7 +19127,7 @@
 </p:sld>
 </file>
 
-<file path=ppt/slides/slide15.xml><?xml version="1.0" encoding="utf-8"?>
+<file path=ppt/slides/slide14.xml><?xml version="1.0" encoding="utf-8"?>
 <p:sld xmlns:a="http://schemas.openxmlformats.org/drawingml/2006/main" xmlns:r="http://schemas.openxmlformats.org/officeDocument/2006/relationships" xmlns:p="http://schemas.openxmlformats.org/presentationml/2006/main">
   <p:cSld>
     <p:bg>
@@ -20239,7 +19347,7 @@
 </p:sld>
 </file>
 
-<file path=ppt/slides/slide16.xml><?xml version="1.0" encoding="utf-8"?>
+<file path=ppt/slides/slide15.xml><?xml version="1.0" encoding="utf-8"?>
 <p:sld xmlns:a="http://schemas.openxmlformats.org/drawingml/2006/main" xmlns:r="http://schemas.openxmlformats.org/officeDocument/2006/relationships" xmlns:p="http://schemas.openxmlformats.org/presentationml/2006/main">
   <p:cSld>
     <p:bg>
@@ -20459,7 +19567,7 @@
 </p:sld>
 </file>
 
-<file path=ppt/slides/slide17.xml><?xml version="1.0" encoding="utf-8"?>
+<file path=ppt/slides/slide16.xml><?xml version="1.0" encoding="utf-8"?>
 <p:sld xmlns:a="http://schemas.openxmlformats.org/drawingml/2006/main" xmlns:r="http://schemas.openxmlformats.org/officeDocument/2006/relationships" xmlns:p="http://schemas.openxmlformats.org/presentationml/2006/main">
   <p:cSld>
     <p:spTree>
@@ -21531,7 +20639,7 @@
 </p:sld>
 </file>
 
-<file path=ppt/slides/slide18.xml><?xml version="1.0" encoding="utf-8"?>
+<file path=ppt/slides/slide17.xml><?xml version="1.0" encoding="utf-8"?>
 <p:sld xmlns:a="http://schemas.openxmlformats.org/drawingml/2006/main" xmlns:r="http://schemas.openxmlformats.org/officeDocument/2006/relationships" xmlns:p="http://schemas.openxmlformats.org/presentationml/2006/main">
   <p:cSld>
     <p:spTree>
@@ -21790,6 +20898,13 @@
                 <a:tailEnd type="none" w="med" len="med"/>
               </a:ln>
             </p:spPr>
+            <p:txBody>
+              <a:bodyPr/>
+              <a:lstStyle/>
+              <a:p>
+                <a:endParaRPr lang="es-ES_tradnl"/>
+              </a:p>
+            </p:txBody>
           </p:sp>
           <p:sp>
             <p:nvSpPr>
@@ -21895,6 +21010,13 @@
                 <a:tailEnd type="none" w="med" len="med"/>
               </a:ln>
             </p:spPr>
+            <p:txBody>
+              <a:bodyPr/>
+              <a:lstStyle/>
+              <a:p>
+                <a:endParaRPr lang="es-ES_tradnl"/>
+              </a:p>
+            </p:txBody>
           </p:sp>
           <p:sp>
             <p:nvSpPr>
@@ -22000,6 +21122,13 @@
                 <a:tailEnd type="none" w="med" len="med"/>
               </a:ln>
             </p:spPr>
+            <p:txBody>
+              <a:bodyPr/>
+              <a:lstStyle/>
+              <a:p>
+                <a:endParaRPr lang="es-ES_tradnl"/>
+              </a:p>
+            </p:txBody>
           </p:sp>
           <p:sp>
             <p:nvSpPr>
@@ -22105,6 +21234,13 @@
                 <a:tailEnd type="none" w="med" len="med"/>
               </a:ln>
             </p:spPr>
+            <p:txBody>
+              <a:bodyPr/>
+              <a:lstStyle/>
+              <a:p>
+                <a:endParaRPr lang="es-ES_tradnl"/>
+              </a:p>
+            </p:txBody>
           </p:sp>
           <p:sp>
             <p:nvSpPr>
@@ -22250,7 +21386,7 @@
 </p:sld>
 </file>
 
-<file path=ppt/slides/slide19.xml><?xml version="1.0" encoding="utf-8"?>
+<file path=ppt/slides/slide18.xml><?xml version="1.0" encoding="utf-8"?>
 <p:sld xmlns:a="http://schemas.openxmlformats.org/drawingml/2006/main" xmlns:r="http://schemas.openxmlformats.org/officeDocument/2006/relationships" xmlns:p="http://schemas.openxmlformats.org/presentationml/2006/main">
   <p:cSld>
     <p:spTree>
@@ -22451,6 +21587,95 @@
     <p:extLst>
       <p:ext uri="{BB962C8B-B14F-4D97-AF65-F5344CB8AC3E}">
         <p14:creationId xmlns:p14="http://schemas.microsoft.com/office/powerpoint/2010/main" val="2533104580"/>
+      </p:ext>
+    </p:extLst>
+  </p:cSld>
+  <p:clrMapOvr>
+    <a:masterClrMapping/>
+  </p:clrMapOvr>
+</p:sld>
+</file>
+
+<file path=ppt/slides/slide19.xml><?xml version="1.0" encoding="utf-8"?>
+<p:sld xmlns:a="http://schemas.openxmlformats.org/drawingml/2006/main" xmlns:r="http://schemas.openxmlformats.org/officeDocument/2006/relationships" xmlns:p="http://schemas.openxmlformats.org/presentationml/2006/main">
+  <p:cSld>
+    <p:spTree>
+      <p:nvGrpSpPr>
+        <p:cNvPr id="1" name=""/>
+        <p:cNvGrpSpPr/>
+        <p:nvPr/>
+      </p:nvGrpSpPr>
+      <p:grpSpPr>
+        <a:xfrm>
+          <a:off x="0" y="0"/>
+          <a:ext cx="0" cy="0"/>
+          <a:chOff x="0" y="0"/>
+          <a:chExt cx="0" cy="0"/>
+        </a:xfrm>
+      </p:grpSpPr>
+      <p:sp>
+        <p:nvSpPr>
+          <p:cNvPr id="2" name="Título 1">
+            <a:extLst>
+              <a:ext uri="{FF2B5EF4-FFF2-40B4-BE49-F238E27FC236}">
+                <a16:creationId xmlns:a16="http://schemas.microsoft.com/office/drawing/2014/main" id="{B24CA486-7FAD-47C9-9964-60A1212490AB}"/>
+              </a:ext>
+            </a:extLst>
+          </p:cNvPr>
+          <p:cNvSpPr>
+            <a:spLocks noGrp="1"/>
+          </p:cNvSpPr>
+          <p:nvPr>
+            <p:ph type="title"/>
+          </p:nvPr>
+        </p:nvSpPr>
+        <p:spPr/>
+        <p:txBody>
+          <a:bodyPr/>
+          <a:lstStyle/>
+          <a:p>
+            <a:r>
+              <a:rPr lang="es-MX" dirty="0"/>
+              <a:t>PRODUCTO AL CLIENTE</a:t>
+            </a:r>
+            <a:endParaRPr lang="es-CO" dirty="0"/>
+          </a:p>
+        </p:txBody>
+      </p:sp>
+      <p:pic>
+        <p:nvPicPr>
+          <p:cNvPr id="4" name="Imagen 3">
+            <a:extLst>
+              <a:ext uri="{FF2B5EF4-FFF2-40B4-BE49-F238E27FC236}">
+                <a16:creationId xmlns:a16="http://schemas.microsoft.com/office/drawing/2014/main" id="{6C308D34-F7EA-4A9F-B398-A574D8EF9775}"/>
+              </a:ext>
+            </a:extLst>
+          </p:cNvPr>
+          <p:cNvPicPr>
+            <a:picLocks noChangeAspect="1"/>
+          </p:cNvPicPr>
+          <p:nvPr/>
+        </p:nvPicPr>
+        <p:blipFill>
+          <a:blip r:embed="rId2"/>
+          <a:stretch>
+            <a:fillRect/>
+          </a:stretch>
+        </p:blipFill>
+        <p:spPr>
+          <a:xfrm>
+            <a:off x="0" y="1162319"/>
+            <a:ext cx="9144000" cy="3536156"/>
+          </a:xfrm>
+          <a:prstGeom prst="rect">
+            <a:avLst/>
+          </a:prstGeom>
+        </p:spPr>
+      </p:pic>
+    </p:spTree>
+    <p:extLst>
+      <p:ext uri="{BB962C8B-B14F-4D97-AF65-F5344CB8AC3E}">
+        <p14:creationId xmlns:p14="http://schemas.microsoft.com/office/powerpoint/2010/main" val="3499399289"/>
       </p:ext>
     </p:extLst>
   </p:cSld>
@@ -28873,95 +28098,6 @@
       </p:sp>
       <p:pic>
         <p:nvPicPr>
-          <p:cNvPr id="4" name="Imagen 3">
-            <a:extLst>
-              <a:ext uri="{FF2B5EF4-FFF2-40B4-BE49-F238E27FC236}">
-                <a16:creationId xmlns:a16="http://schemas.microsoft.com/office/drawing/2014/main" id="{6C308D34-F7EA-4A9F-B398-A574D8EF9775}"/>
-              </a:ext>
-            </a:extLst>
-          </p:cNvPr>
-          <p:cNvPicPr>
-            <a:picLocks noChangeAspect="1"/>
-          </p:cNvPicPr>
-          <p:nvPr/>
-        </p:nvPicPr>
-        <p:blipFill>
-          <a:blip r:embed="rId2"/>
-          <a:stretch>
-            <a:fillRect/>
-          </a:stretch>
-        </p:blipFill>
-        <p:spPr>
-          <a:xfrm>
-            <a:off x="0" y="1162319"/>
-            <a:ext cx="9144000" cy="3536156"/>
-          </a:xfrm>
-          <a:prstGeom prst="rect">
-            <a:avLst/>
-          </a:prstGeom>
-        </p:spPr>
-      </p:pic>
-    </p:spTree>
-    <p:extLst>
-      <p:ext uri="{BB962C8B-B14F-4D97-AF65-F5344CB8AC3E}">
-        <p14:creationId xmlns:p14="http://schemas.microsoft.com/office/powerpoint/2010/main" val="3499399289"/>
-      </p:ext>
-    </p:extLst>
-  </p:cSld>
-  <p:clrMapOvr>
-    <a:masterClrMapping/>
-  </p:clrMapOvr>
-</p:sld>
-</file>
-
-<file path=ppt/slides/slide21.xml><?xml version="1.0" encoding="utf-8"?>
-<p:sld xmlns:a="http://schemas.openxmlformats.org/drawingml/2006/main" xmlns:r="http://schemas.openxmlformats.org/officeDocument/2006/relationships" xmlns:p="http://schemas.openxmlformats.org/presentationml/2006/main">
-  <p:cSld>
-    <p:spTree>
-      <p:nvGrpSpPr>
-        <p:cNvPr id="1" name=""/>
-        <p:cNvGrpSpPr/>
-        <p:nvPr/>
-      </p:nvGrpSpPr>
-      <p:grpSpPr>
-        <a:xfrm>
-          <a:off x="0" y="0"/>
-          <a:ext cx="0" cy="0"/>
-          <a:chOff x="0" y="0"/>
-          <a:chExt cx="0" cy="0"/>
-        </a:xfrm>
-      </p:grpSpPr>
-      <p:sp>
-        <p:nvSpPr>
-          <p:cNvPr id="2" name="Título 1">
-            <a:extLst>
-              <a:ext uri="{FF2B5EF4-FFF2-40B4-BE49-F238E27FC236}">
-                <a16:creationId xmlns:a16="http://schemas.microsoft.com/office/drawing/2014/main" id="{B24CA486-7FAD-47C9-9964-60A1212490AB}"/>
-              </a:ext>
-            </a:extLst>
-          </p:cNvPr>
-          <p:cNvSpPr>
-            <a:spLocks noGrp="1"/>
-          </p:cNvSpPr>
-          <p:nvPr>
-            <p:ph type="title"/>
-          </p:nvPr>
-        </p:nvSpPr>
-        <p:spPr/>
-        <p:txBody>
-          <a:bodyPr/>
-          <a:lstStyle/>
-          <a:p>
-            <a:r>
-              <a:rPr lang="es-MX" dirty="0"/>
-              <a:t>PRODUCTO AL CLIENTE</a:t>
-            </a:r>
-            <a:endParaRPr lang="es-CO" dirty="0"/>
-          </a:p>
-        </p:txBody>
-      </p:sp>
-      <p:pic>
-        <p:nvPicPr>
           <p:cNvPr id="7" name="Imagen 6">
             <a:extLst>
               <a:ext uri="{FF2B5EF4-FFF2-40B4-BE49-F238E27FC236}">
@@ -29033,7 +28169,7 @@
 </p:sld>
 </file>
 
-<file path=ppt/slides/slide22.xml><?xml version="1.0" encoding="utf-8"?>
+<file path=ppt/slides/slide21.xml><?xml version="1.0" encoding="utf-8"?>
 <p:sld xmlns:a="http://schemas.openxmlformats.org/drawingml/2006/main" xmlns:r="http://schemas.openxmlformats.org/officeDocument/2006/relationships" xmlns:p="http://schemas.openxmlformats.org/presentationml/2006/main">
   <p:cSld>
     <p:spTree>
@@ -29180,7 +28316,7 @@
 </p:sld>
 </file>
 
-<file path=ppt/slides/slide23.xml><?xml version="1.0" encoding="utf-8"?>
+<file path=ppt/slides/slide22.xml><?xml version="1.0" encoding="utf-8"?>
 <p:sld xmlns:a="http://schemas.openxmlformats.org/drawingml/2006/main" xmlns:r="http://schemas.openxmlformats.org/officeDocument/2006/relationships" xmlns:p="http://schemas.openxmlformats.org/presentationml/2006/main">
   <p:cSld>
     <p:spTree>
@@ -29327,7 +28463,7 @@
 </p:sld>
 </file>
 
-<file path=ppt/slides/slide24.xml><?xml version="1.0" encoding="utf-8"?>
+<file path=ppt/slides/slide23.xml><?xml version="1.0" encoding="utf-8"?>
 <p:sld xmlns:a="http://schemas.openxmlformats.org/drawingml/2006/main" xmlns:r="http://schemas.openxmlformats.org/officeDocument/2006/relationships" xmlns:p="http://schemas.openxmlformats.org/presentationml/2006/main">
   <p:cSld>
     <p:spTree>
@@ -29586,6 +28722,13 @@
                 <a:tailEnd type="none" w="med" len="med"/>
               </a:ln>
             </p:spPr>
+            <p:txBody>
+              <a:bodyPr/>
+              <a:lstStyle/>
+              <a:p>
+                <a:endParaRPr lang="es-ES_tradnl"/>
+              </a:p>
+            </p:txBody>
           </p:sp>
           <p:sp>
             <p:nvSpPr>
@@ -29691,6 +28834,13 @@
                 <a:tailEnd type="none" w="med" len="med"/>
               </a:ln>
             </p:spPr>
+            <p:txBody>
+              <a:bodyPr/>
+              <a:lstStyle/>
+              <a:p>
+                <a:endParaRPr lang="es-ES_tradnl"/>
+              </a:p>
+            </p:txBody>
           </p:sp>
           <p:sp>
             <p:nvSpPr>
@@ -29796,6 +28946,13 @@
                 <a:tailEnd type="none" w="med" len="med"/>
               </a:ln>
             </p:spPr>
+            <p:txBody>
+              <a:bodyPr/>
+              <a:lstStyle/>
+              <a:p>
+                <a:endParaRPr lang="es-ES_tradnl"/>
+              </a:p>
+            </p:txBody>
           </p:sp>
           <p:sp>
             <p:nvSpPr>
@@ -29901,6 +29058,13 @@
                 <a:tailEnd type="none" w="med" len="med"/>
               </a:ln>
             </p:spPr>
+            <p:txBody>
+              <a:bodyPr/>
+              <a:lstStyle/>
+              <a:p>
+                <a:endParaRPr lang="es-ES_tradnl"/>
+              </a:p>
+            </p:txBody>
           </p:sp>
           <p:sp>
             <p:nvSpPr>
@@ -30046,7 +29210,7 @@
 </p:sld>
 </file>
 
-<file path=ppt/slides/slide25.xml><?xml version="1.0" encoding="utf-8"?>
+<file path=ppt/slides/slide24.xml><?xml version="1.0" encoding="utf-8"?>
 <p:sld xmlns:a="http://schemas.openxmlformats.org/drawingml/2006/main" xmlns:r="http://schemas.openxmlformats.org/officeDocument/2006/relationships" xmlns:p="http://schemas.openxmlformats.org/presentationml/2006/main">
   <p:cSld>
     <p:spTree>
@@ -30853,6 +30017,13 @@
                 <a:tailEnd type="none" w="med" len="med"/>
               </a:ln>
             </p:spPr>
+            <p:txBody>
+              <a:bodyPr/>
+              <a:lstStyle/>
+              <a:p>
+                <a:endParaRPr lang="es-ES_tradnl"/>
+              </a:p>
+            </p:txBody>
           </p:sp>
           <p:sp>
             <p:nvSpPr>
@@ -30958,6 +30129,13 @@
                 <a:tailEnd type="none" w="med" len="med"/>
               </a:ln>
             </p:spPr>
+            <p:txBody>
+              <a:bodyPr/>
+              <a:lstStyle/>
+              <a:p>
+                <a:endParaRPr lang="es-ES_tradnl"/>
+              </a:p>
+            </p:txBody>
           </p:sp>
           <p:sp>
             <p:nvSpPr>
@@ -31063,6 +30241,13 @@
                 <a:tailEnd type="none" w="med" len="med"/>
               </a:ln>
             </p:spPr>
+            <p:txBody>
+              <a:bodyPr/>
+              <a:lstStyle/>
+              <a:p>
+                <a:endParaRPr lang="es-ES_tradnl"/>
+              </a:p>
+            </p:txBody>
           </p:sp>
           <p:sp>
             <p:nvSpPr>
@@ -31168,6 +30353,13 @@
                 <a:tailEnd type="none" w="med" len="med"/>
               </a:ln>
             </p:spPr>
+            <p:txBody>
+              <a:bodyPr/>
+              <a:lstStyle/>
+              <a:p>
+                <a:endParaRPr lang="es-ES_tradnl"/>
+              </a:p>
+            </p:txBody>
           </p:sp>
           <p:sp>
             <p:nvSpPr>
@@ -31309,368 +30501,6 @@
 </file>
 
 <file path=ppt/slides/slide4.xml><?xml version="1.0" encoding="utf-8"?>
-<p:sld xmlns:a="http://schemas.openxmlformats.org/drawingml/2006/main" xmlns:r="http://schemas.openxmlformats.org/officeDocument/2006/relationships" xmlns:p="http://schemas.openxmlformats.org/presentationml/2006/main">
-  <p:cSld>
-    <p:spTree>
-      <p:nvGrpSpPr>
-        <p:cNvPr id="1" name="Shape 938"/>
-        <p:cNvGrpSpPr/>
-        <p:nvPr/>
-      </p:nvGrpSpPr>
-      <p:grpSpPr>
-        <a:xfrm>
-          <a:off x="0" y="0"/>
-          <a:ext cx="0" cy="0"/>
-          <a:chOff x="0" y="0"/>
-          <a:chExt cx="0" cy="0"/>
-        </a:xfrm>
-      </p:grpSpPr>
-      <p:sp>
-        <p:nvSpPr>
-          <p:cNvPr id="939" name="Google Shape;939;p41"/>
-          <p:cNvSpPr txBox="1">
-            <a:spLocks noGrp="1"/>
-          </p:cNvSpPr>
-          <p:nvPr>
-            <p:ph type="title"/>
-          </p:nvPr>
-        </p:nvSpPr>
-        <p:spPr>
-          <a:xfrm>
-            <a:off x="720000" y="445025"/>
-            <a:ext cx="7704000" cy="572700"/>
-          </a:xfrm>
-          <a:prstGeom prst="rect">
-            <a:avLst/>
-          </a:prstGeom>
-        </p:spPr>
-        <p:txBody>
-          <a:bodyPr spcFirstLastPara="1" wrap="square" lIns="91425" tIns="91425" rIns="91425" bIns="91425" anchor="t" anchorCtr="0">
-            <a:noAutofit/>
-          </a:bodyPr>
-          <a:lstStyle/>
-          <a:p>
-            <a:pPr marL="0" lvl="0" indent="0" algn="ctr" rtl="0">
-              <a:spcBef>
-                <a:spcPts val="0"/>
-              </a:spcBef>
-              <a:spcAft>
-                <a:spcPts val="0"/>
-              </a:spcAft>
-              <a:buNone/>
-            </a:pPr>
-            <a:r>
-              <a:rPr lang="en" sz="2000" dirty="0"/>
-              <a:t>¿QUÉ SON LAS PRUEBAS SABER 11 EN EL PAÍS?</a:t>
-            </a:r>
-            <a:endParaRPr sz="2000" dirty="0"/>
-          </a:p>
-        </p:txBody>
-      </p:sp>
-      <p:sp>
-        <p:nvSpPr>
-          <p:cNvPr id="4" name="CuadroTexto 3">
-            <a:extLst>
-              <a:ext uri="{FF2B5EF4-FFF2-40B4-BE49-F238E27FC236}">
-                <a16:creationId xmlns:a16="http://schemas.microsoft.com/office/drawing/2014/main" id="{BCC957EA-EB5F-4814-8727-E7FFBAD1CF7A}"/>
-              </a:ext>
-            </a:extLst>
-          </p:cNvPr>
-          <p:cNvSpPr txBox="1"/>
-          <p:nvPr/>
-        </p:nvSpPr>
-        <p:spPr>
-          <a:xfrm>
-            <a:off x="892885" y="982049"/>
-            <a:ext cx="7531115" cy="554639"/>
-          </a:xfrm>
-          <a:prstGeom prst="rect">
-            <a:avLst/>
-          </a:prstGeom>
-          <a:noFill/>
-        </p:spPr>
-        <p:txBody>
-          <a:bodyPr wrap="square" rtlCol="0">
-            <a:spAutoFit/>
-          </a:bodyPr>
-          <a:lstStyle/>
-          <a:p>
-            <a:pPr algn="ctr">
-              <a:lnSpc>
-                <a:spcPts val="1900"/>
-              </a:lnSpc>
-            </a:pPr>
-            <a:r>
-              <a:rPr lang="es-MX" b="0" i="0" dirty="0">
-                <a:solidFill>
-                  <a:srgbClr val="1F1F1F"/>
-                </a:solidFill>
-                <a:effectLst/>
-                <a:latin typeface="Barlow" panose="00000500000000000000" pitchFamily="2" charset="0"/>
-              </a:rPr>
-              <a:t>Son un examen estandarizado que evalúa los conocimientos y habilidades de los estudiantes que están finalizando el grado undécimo.</a:t>
-            </a:r>
-          </a:p>
-        </p:txBody>
-      </p:sp>
-      <p:sp>
-        <p:nvSpPr>
-          <p:cNvPr id="15" name="CuadroTexto 14">
-            <a:extLst>
-              <a:ext uri="{FF2B5EF4-FFF2-40B4-BE49-F238E27FC236}">
-                <a16:creationId xmlns:a16="http://schemas.microsoft.com/office/drawing/2014/main" id="{ABFE6C7D-227A-4634-AD71-773AC5240865}"/>
-              </a:ext>
-            </a:extLst>
-          </p:cNvPr>
-          <p:cNvSpPr txBox="1"/>
-          <p:nvPr/>
-        </p:nvSpPr>
-        <p:spPr>
-          <a:xfrm>
-            <a:off x="806440" y="1687001"/>
-            <a:ext cx="7531115" cy="307777"/>
-          </a:xfrm>
-          <a:prstGeom prst="rect">
-            <a:avLst/>
-          </a:prstGeom>
-          <a:noFill/>
-        </p:spPr>
-        <p:txBody>
-          <a:bodyPr wrap="square" rtlCol="0">
-            <a:spAutoFit/>
-          </a:bodyPr>
-          <a:lstStyle/>
-          <a:p>
-            <a:pPr algn="ctr"/>
-            <a:r>
-              <a:rPr lang="es-MX" b="0" i="0" dirty="0">
-                <a:solidFill>
-                  <a:srgbClr val="1F1F1F"/>
-                </a:solidFill>
-                <a:effectLst/>
-                <a:latin typeface="Barlow" panose="00000500000000000000" pitchFamily="2" charset="0"/>
-              </a:rPr>
-              <a:t>A continuación, se presentan datos sobre los resultados en las pruebas Saber 11 de 2022:</a:t>
-            </a:r>
-          </a:p>
-        </p:txBody>
-      </p:sp>
-      <p:sp>
-        <p:nvSpPr>
-          <p:cNvPr id="3" name="CuadroTexto 2">
-            <a:extLst>
-              <a:ext uri="{FF2B5EF4-FFF2-40B4-BE49-F238E27FC236}">
-                <a16:creationId xmlns:a16="http://schemas.microsoft.com/office/drawing/2014/main" id="{F8A9E464-2710-4022-A41E-884537B71470}"/>
-              </a:ext>
-            </a:extLst>
-          </p:cNvPr>
-          <p:cNvSpPr txBox="1"/>
-          <p:nvPr/>
-        </p:nvSpPr>
-        <p:spPr>
-          <a:xfrm>
-            <a:off x="629190" y="2145091"/>
-            <a:ext cx="7885614" cy="1285608"/>
-          </a:xfrm>
-          <a:prstGeom prst="rect">
-            <a:avLst/>
-          </a:prstGeom>
-          <a:noFill/>
-        </p:spPr>
-        <p:txBody>
-          <a:bodyPr wrap="square" rtlCol="0">
-            <a:spAutoFit/>
-          </a:bodyPr>
-          <a:lstStyle/>
-          <a:p>
-            <a:pPr marL="285750" indent="-285750" algn="just">
-              <a:lnSpc>
-                <a:spcPts val="1900"/>
-              </a:lnSpc>
-              <a:buFont typeface="Arial" panose="020B0604020202020204" pitchFamily="34" charset="0"/>
-              <a:buChar char="•"/>
-            </a:pPr>
-            <a:r>
-              <a:rPr lang="es-MX" dirty="0">
-                <a:latin typeface="Barlow" panose="00000500000000000000" pitchFamily="2" charset="0"/>
-              </a:rPr>
-              <a:t>Los estudiantes de los </a:t>
-            </a:r>
-            <a:r>
-              <a:rPr lang="es-MX" b="1" dirty="0">
-                <a:latin typeface="Barlow" panose="00000500000000000000" pitchFamily="2" charset="0"/>
-              </a:rPr>
-              <a:t>colegios privados </a:t>
-            </a:r>
-            <a:r>
-              <a:rPr lang="es-MX" dirty="0">
-                <a:latin typeface="Barlow" panose="00000500000000000000" pitchFamily="2" charset="0"/>
-              </a:rPr>
-              <a:t>obtuvieron un promedio de 313 puntos, mientras que los estudiantes de los </a:t>
-            </a:r>
-            <a:r>
-              <a:rPr lang="es-MX" b="1" dirty="0">
-                <a:latin typeface="Barlow" panose="00000500000000000000" pitchFamily="2" charset="0"/>
-              </a:rPr>
-              <a:t>colegios públicos </a:t>
-            </a:r>
-            <a:r>
-              <a:rPr lang="es-MX" dirty="0">
-                <a:latin typeface="Barlow" panose="00000500000000000000" pitchFamily="2" charset="0"/>
-              </a:rPr>
-              <a:t>obtuvieron un promedio de 287 puntos.</a:t>
-            </a:r>
-          </a:p>
-          <a:p>
-            <a:pPr algn="just">
-              <a:lnSpc>
-                <a:spcPts val="1900"/>
-              </a:lnSpc>
-            </a:pPr>
-            <a:endParaRPr lang="es-MX" dirty="0">
-              <a:latin typeface="Barlow" panose="00000500000000000000" pitchFamily="2" charset="0"/>
-            </a:endParaRPr>
-          </a:p>
-          <a:p>
-            <a:pPr marL="285750" indent="-285750" algn="just">
-              <a:lnSpc>
-                <a:spcPts val="1900"/>
-              </a:lnSpc>
-              <a:buFont typeface="Arial" panose="020B0604020202020204" pitchFamily="34" charset="0"/>
-              <a:buChar char="•"/>
-            </a:pPr>
-            <a:r>
-              <a:rPr lang="es-MX" dirty="0">
-                <a:latin typeface="Barlow" panose="00000500000000000000" pitchFamily="2" charset="0"/>
-              </a:rPr>
-              <a:t>Los estudiantes de </a:t>
-            </a:r>
-            <a:r>
-              <a:rPr lang="es-MX" b="1" dirty="0">
-                <a:latin typeface="Barlow" panose="00000500000000000000" pitchFamily="2" charset="0"/>
-              </a:rPr>
-              <a:t>Bogotá, Antioquia </a:t>
-            </a:r>
-            <a:r>
-              <a:rPr lang="es-MX" dirty="0">
-                <a:latin typeface="Barlow" panose="00000500000000000000" pitchFamily="2" charset="0"/>
-              </a:rPr>
-              <a:t>y</a:t>
-            </a:r>
-            <a:r>
-              <a:rPr lang="es-MX" b="1" dirty="0">
-                <a:latin typeface="Barlow" panose="00000500000000000000" pitchFamily="2" charset="0"/>
-              </a:rPr>
-              <a:t> Valle del Cauca </a:t>
-            </a:r>
-            <a:r>
-              <a:rPr lang="es-MX" dirty="0">
-                <a:latin typeface="Barlow" panose="00000500000000000000" pitchFamily="2" charset="0"/>
-              </a:rPr>
-              <a:t>obtuvieron los puntajes más altos, mientras que los estudiantes de </a:t>
-            </a:r>
-            <a:r>
-              <a:rPr lang="es-MX" b="1" dirty="0">
-                <a:latin typeface="Barlow" panose="00000500000000000000" pitchFamily="2" charset="0"/>
-              </a:rPr>
-              <a:t>La Guajira, Vaupés</a:t>
-            </a:r>
-            <a:r>
-              <a:rPr lang="es-MX" dirty="0">
-                <a:latin typeface="Barlow" panose="00000500000000000000" pitchFamily="2" charset="0"/>
-              </a:rPr>
-              <a:t> y </a:t>
-            </a:r>
-            <a:r>
-              <a:rPr lang="es-MX" b="1" dirty="0">
-                <a:latin typeface="Barlow" panose="00000500000000000000" pitchFamily="2" charset="0"/>
-              </a:rPr>
-              <a:t>Chocó </a:t>
-            </a:r>
-            <a:r>
-              <a:rPr lang="es-MX" dirty="0">
-                <a:latin typeface="Barlow" panose="00000500000000000000" pitchFamily="2" charset="0"/>
-              </a:rPr>
-              <a:t>obtuvieron los puntajes más bajos.</a:t>
-            </a:r>
-            <a:endParaRPr lang="es-CO" dirty="0">
-              <a:latin typeface="Barlow" panose="00000500000000000000" pitchFamily="2" charset="0"/>
-            </a:endParaRPr>
-          </a:p>
-        </p:txBody>
-      </p:sp>
-      <p:pic>
-        <p:nvPicPr>
-          <p:cNvPr id="1026" name="Picture 2" descr="La educación superior en Colombia no escapa a la inequidad y la desigualdad">
-            <a:extLst>
-              <a:ext uri="{FF2B5EF4-FFF2-40B4-BE49-F238E27FC236}">
-                <a16:creationId xmlns:a16="http://schemas.microsoft.com/office/drawing/2014/main" id="{901914C6-9FEB-4A2D-AB0D-A3394D837191}"/>
-              </a:ext>
-            </a:extLst>
-          </p:cNvPr>
-          <p:cNvPicPr>
-            <a:picLocks noChangeAspect="1" noChangeArrowheads="1"/>
-          </p:cNvPicPr>
-          <p:nvPr/>
-        </p:nvPicPr>
-        <p:blipFill>
-          <a:blip r:embed="rId3">
-            <a:extLst>
-              <a:ext uri="{BEBA8EAE-BF5A-486C-A8C5-ECC9F3942E4B}">
-                <a14:imgProps xmlns:a14="http://schemas.microsoft.com/office/drawing/2010/main">
-                  <a14:imgLayer r:embed="rId4">
-                    <a14:imgEffect>
-                      <a14:backgroundRemoval t="2529" b="92644" l="5505" r="92966">
-                        <a14:foregroundMark x1="5505" y1="62069" x2="8869" y2="65747"/>
-                        <a14:foregroundMark x1="44954" y1="9195" x2="52599" y2="5977"/>
-                        <a14:foregroundMark x1="57187" y1="2529" x2="54434" y2="3908"/>
-                        <a14:foregroundMark x1="89908" y1="53103" x2="89908" y2="53103"/>
-                        <a14:foregroundMark x1="90826" y1="59770" x2="93272" y2="64598"/>
-                        <a14:foregroundMark x1="69419" y1="92644" x2="69419" y2="90575"/>
-                      </a14:backgroundRemoval>
-                    </a14:imgEffect>
-                  </a14:imgLayer>
-                </a14:imgProps>
-              </a:ext>
-              <a:ext uri="{28A0092B-C50C-407E-A947-70E740481C1C}">
-                <a14:useLocalDpi xmlns:a14="http://schemas.microsoft.com/office/drawing/2010/main" val="0"/>
-              </a:ext>
-            </a:extLst>
-          </a:blip>
-          <a:srcRect/>
-          <a:stretch>
-            <a:fillRect/>
-          </a:stretch>
-        </p:blipFill>
-        <p:spPr bwMode="auto">
-          <a:xfrm>
-            <a:off x="3958249" y="3507169"/>
-            <a:ext cx="1227495" cy="1632906"/>
-          </a:xfrm>
-          <a:prstGeom prst="rect">
-            <a:avLst/>
-          </a:prstGeom>
-          <a:noFill/>
-          <a:extLst>
-            <a:ext uri="{909E8E84-426E-40DD-AFC4-6F175D3DCCD1}">
-              <a14:hiddenFill xmlns:a14="http://schemas.microsoft.com/office/drawing/2010/main">
-                <a:solidFill>
-                  <a:srgbClr val="FFFFFF"/>
-                </a:solidFill>
-              </a14:hiddenFill>
-            </a:ext>
-          </a:extLst>
-        </p:spPr>
-      </p:pic>
-    </p:spTree>
-  </p:cSld>
-  <p:clrMapOvr>
-    <a:masterClrMapping/>
-  </p:clrMapOvr>
-</p:sld>
-</file>
-
-<file path=ppt/slides/slide5.xml><?xml version="1.0" encoding="utf-8"?>
 <p:sld xmlns:a="http://schemas.openxmlformats.org/drawingml/2006/main" xmlns:r="http://schemas.openxmlformats.org/officeDocument/2006/relationships" xmlns:p="http://schemas.openxmlformats.org/presentationml/2006/main">
   <p:cSld>
     <p:spTree>
@@ -32037,7 +30867,7 @@
 </p:sld>
 </file>
 
-<file path=ppt/slides/slide6.xml><?xml version="1.0" encoding="utf-8"?>
+<file path=ppt/slides/slide5.xml><?xml version="1.0" encoding="utf-8"?>
 <p:sld xmlns:a="http://schemas.openxmlformats.org/drawingml/2006/main" xmlns:r="http://schemas.openxmlformats.org/officeDocument/2006/relationships" xmlns:p="http://schemas.openxmlformats.org/presentationml/2006/main">
   <p:cSld>
     <p:spTree>
@@ -32335,7 +31165,7 @@
 </p:sld>
 </file>
 
-<file path=ppt/slides/slide7.xml><?xml version="1.0" encoding="utf-8"?>
+<file path=ppt/slides/slide6.xml><?xml version="1.0" encoding="utf-8"?>
 <p:sld xmlns:a="http://schemas.openxmlformats.org/drawingml/2006/main" xmlns:r="http://schemas.openxmlformats.org/officeDocument/2006/relationships" xmlns:p="http://schemas.openxmlformats.org/presentationml/2006/main">
   <p:cSld>
     <p:spTree>
@@ -32594,6 +31424,13 @@
                 <a:tailEnd type="none" w="med" len="med"/>
               </a:ln>
             </p:spPr>
+            <p:txBody>
+              <a:bodyPr/>
+              <a:lstStyle/>
+              <a:p>
+                <a:endParaRPr lang="es-ES_tradnl"/>
+              </a:p>
+            </p:txBody>
           </p:sp>
           <p:sp>
             <p:nvSpPr>
@@ -32699,6 +31536,13 @@
                 <a:tailEnd type="none" w="med" len="med"/>
               </a:ln>
             </p:spPr>
+            <p:txBody>
+              <a:bodyPr/>
+              <a:lstStyle/>
+              <a:p>
+                <a:endParaRPr lang="es-ES_tradnl"/>
+              </a:p>
+            </p:txBody>
           </p:sp>
           <p:sp>
             <p:nvSpPr>
@@ -32804,6 +31648,13 @@
                 <a:tailEnd type="none" w="med" len="med"/>
               </a:ln>
             </p:spPr>
+            <p:txBody>
+              <a:bodyPr/>
+              <a:lstStyle/>
+              <a:p>
+                <a:endParaRPr lang="es-ES_tradnl"/>
+              </a:p>
+            </p:txBody>
           </p:sp>
           <p:sp>
             <p:nvSpPr>
@@ -32909,6 +31760,13 @@
                 <a:tailEnd type="none" w="med" len="med"/>
               </a:ln>
             </p:spPr>
+            <p:txBody>
+              <a:bodyPr/>
+              <a:lstStyle/>
+              <a:p>
+                <a:endParaRPr lang="es-ES_tradnl"/>
+              </a:p>
+            </p:txBody>
           </p:sp>
           <p:sp>
             <p:nvSpPr>
@@ -33054,7 +31912,7 @@
 </p:sld>
 </file>
 
-<file path=ppt/slides/slide8.xml><?xml version="1.0" encoding="utf-8"?>
+<file path=ppt/slides/slide7.xml><?xml version="1.0" encoding="utf-8"?>
 <p:sld xmlns:a="http://schemas.openxmlformats.org/drawingml/2006/main" xmlns:r="http://schemas.openxmlformats.org/officeDocument/2006/relationships" xmlns:p="http://schemas.openxmlformats.org/presentationml/2006/main">
   <p:cSld>
     <p:spTree>
@@ -34517,7 +33375,7 @@
 </p:sld>
 </file>
 
-<file path=ppt/slides/slide9.xml><?xml version="1.0" encoding="utf-8"?>
+<file path=ppt/slides/slide8.xml><?xml version="1.0" encoding="utf-8"?>
 <p:sld xmlns:a="http://schemas.openxmlformats.org/drawingml/2006/main" xmlns:r="http://schemas.openxmlformats.org/officeDocument/2006/relationships" xmlns:p="http://schemas.openxmlformats.org/presentationml/2006/main">
   <p:cSld>
     <p:spTree>
@@ -34776,6 +33634,13 @@
                 <a:tailEnd type="none" w="med" len="med"/>
               </a:ln>
             </p:spPr>
+            <p:txBody>
+              <a:bodyPr/>
+              <a:lstStyle/>
+              <a:p>
+                <a:endParaRPr lang="es-ES_tradnl"/>
+              </a:p>
+            </p:txBody>
           </p:sp>
           <p:sp>
             <p:nvSpPr>
@@ -34881,6 +33746,13 @@
                 <a:tailEnd type="none" w="med" len="med"/>
               </a:ln>
             </p:spPr>
+            <p:txBody>
+              <a:bodyPr/>
+              <a:lstStyle/>
+              <a:p>
+                <a:endParaRPr lang="es-ES_tradnl"/>
+              </a:p>
+            </p:txBody>
           </p:sp>
           <p:sp>
             <p:nvSpPr>
@@ -34986,6 +33858,13 @@
                 <a:tailEnd type="none" w="med" len="med"/>
               </a:ln>
             </p:spPr>
+            <p:txBody>
+              <a:bodyPr/>
+              <a:lstStyle/>
+              <a:p>
+                <a:endParaRPr lang="es-ES_tradnl"/>
+              </a:p>
+            </p:txBody>
           </p:sp>
           <p:sp>
             <p:nvSpPr>
@@ -35091,6 +33970,13 @@
                 <a:tailEnd type="none" w="med" len="med"/>
               </a:ln>
             </p:spPr>
+            <p:txBody>
+              <a:bodyPr/>
+              <a:lstStyle/>
+              <a:p>
+                <a:endParaRPr lang="es-ES_tradnl"/>
+              </a:p>
+            </p:txBody>
           </p:sp>
           <p:sp>
             <p:nvSpPr>
@@ -35227,6 +34113,865 @@
     <p:extLst>
       <p:ext uri="{BB962C8B-B14F-4D97-AF65-F5344CB8AC3E}">
         <p14:creationId xmlns:p14="http://schemas.microsoft.com/office/powerpoint/2010/main" val="3836828100"/>
+      </p:ext>
+    </p:extLst>
+  </p:cSld>
+  <p:clrMapOvr>
+    <a:masterClrMapping/>
+  </p:clrMapOvr>
+</p:sld>
+</file>
+
+<file path=ppt/slides/slide9.xml><?xml version="1.0" encoding="utf-8"?>
+<p:sld xmlns:a="http://schemas.openxmlformats.org/drawingml/2006/main" xmlns:r="http://schemas.openxmlformats.org/officeDocument/2006/relationships" xmlns:p="http://schemas.openxmlformats.org/presentationml/2006/main">
+  <p:cSld>
+    <p:bg>
+      <p:bgPr>
+        <a:solidFill>
+          <a:schemeClr val="accent6"/>
+        </a:solidFill>
+        <a:effectLst/>
+      </p:bgPr>
+    </p:bg>
+    <p:spTree>
+      <p:nvGrpSpPr>
+        <p:cNvPr id="1" name="Shape 945"/>
+        <p:cNvGrpSpPr/>
+        <p:nvPr/>
+      </p:nvGrpSpPr>
+      <p:grpSpPr>
+        <a:xfrm>
+          <a:off x="0" y="0"/>
+          <a:ext cx="0" cy="0"/>
+          <a:chOff x="0" y="0"/>
+          <a:chExt cx="0" cy="0"/>
+        </a:xfrm>
+      </p:grpSpPr>
+      <p:sp>
+        <p:nvSpPr>
+          <p:cNvPr id="11" name="Rectángulo 10">
+            <a:extLst>
+              <a:ext uri="{FF2B5EF4-FFF2-40B4-BE49-F238E27FC236}">
+                <a16:creationId xmlns:a16="http://schemas.microsoft.com/office/drawing/2014/main" id="{FD023D06-7B51-48F8-A393-FDF2764FF17A}"/>
+              </a:ext>
+            </a:extLst>
+          </p:cNvPr>
+          <p:cNvSpPr/>
+          <p:nvPr/>
+        </p:nvSpPr>
+        <p:spPr>
+          <a:xfrm>
+            <a:off x="11151" y="3869473"/>
+            <a:ext cx="3668751" cy="1262876"/>
+          </a:xfrm>
+          <a:prstGeom prst="rect">
+            <a:avLst/>
+          </a:prstGeom>
+          <a:solidFill>
+            <a:schemeClr val="accent6"/>
+          </a:solidFill>
+          <a:ln>
+            <a:solidFill>
+              <a:schemeClr val="accent6"/>
+            </a:solidFill>
+          </a:ln>
+        </p:spPr>
+        <p:style>
+          <a:lnRef idx="2">
+            <a:schemeClr val="accent1">
+              <a:shade val="50000"/>
+            </a:schemeClr>
+          </a:lnRef>
+          <a:fillRef idx="1">
+            <a:schemeClr val="accent1"/>
+          </a:fillRef>
+          <a:effectRef idx="0">
+            <a:schemeClr val="accent1"/>
+          </a:effectRef>
+          <a:fontRef idx="minor">
+            <a:schemeClr val="lt1"/>
+          </a:fontRef>
+        </p:style>
+        <p:txBody>
+          <a:bodyPr rtlCol="0" anchor="ctr"/>
+          <a:lstStyle/>
+          <a:p>
+            <a:pPr algn="ctr"/>
+            <a:endParaRPr lang="es-CO"/>
+          </a:p>
+        </p:txBody>
+      </p:sp>
+      <p:sp>
+        <p:nvSpPr>
+          <p:cNvPr id="946" name="Google Shape;946;p42"/>
+          <p:cNvSpPr txBox="1">
+            <a:spLocks noGrp="1"/>
+          </p:cNvSpPr>
+          <p:nvPr>
+            <p:ph type="title"/>
+          </p:nvPr>
+        </p:nvSpPr>
+        <p:spPr>
+          <a:xfrm>
+            <a:off x="720000" y="445025"/>
+            <a:ext cx="7710900" cy="572700"/>
+          </a:xfrm>
+          <a:prstGeom prst="rect">
+            <a:avLst/>
+          </a:prstGeom>
+        </p:spPr>
+        <p:txBody>
+          <a:bodyPr spcFirstLastPara="1" wrap="square" lIns="91425" tIns="91425" rIns="91425" bIns="91425" anchor="t" anchorCtr="0">
+            <a:noAutofit/>
+          </a:bodyPr>
+          <a:lstStyle/>
+          <a:p>
+            <a:pPr marL="0" lvl="0" indent="0" algn="ctr" rtl="0">
+              <a:spcBef>
+                <a:spcPts val="0"/>
+              </a:spcBef>
+              <a:spcAft>
+                <a:spcPts val="0"/>
+              </a:spcAft>
+              <a:buNone/>
+            </a:pPr>
+            <a:r>
+              <a:rPr lang="en" dirty="0"/>
+              <a:t>VISUALIZACIÓN 1</a:t>
+            </a:r>
+            <a:endParaRPr dirty="0"/>
+          </a:p>
+        </p:txBody>
+      </p:sp>
+      <p:sp>
+        <p:nvSpPr>
+          <p:cNvPr id="2" name="CuadroTexto 1">
+            <a:extLst>
+              <a:ext uri="{FF2B5EF4-FFF2-40B4-BE49-F238E27FC236}">
+                <a16:creationId xmlns:a16="http://schemas.microsoft.com/office/drawing/2014/main" id="{1C6A3ACD-BE1A-47AF-9D12-61C40D00DB55}"/>
+              </a:ext>
+            </a:extLst>
+          </p:cNvPr>
+          <p:cNvSpPr txBox="1"/>
+          <p:nvPr/>
+        </p:nvSpPr>
+        <p:spPr>
+          <a:xfrm>
+            <a:off x="5695510" y="1478730"/>
+            <a:ext cx="3290949" cy="2987356"/>
+          </a:xfrm>
+          <a:prstGeom prst="rect">
+            <a:avLst/>
+          </a:prstGeom>
+          <a:noFill/>
+        </p:spPr>
+        <p:txBody>
+          <a:bodyPr wrap="square" rtlCol="0">
+            <a:spAutoFit/>
+          </a:bodyPr>
+          <a:lstStyle/>
+          <a:p>
+            <a:pPr marL="285750" indent="-285750" algn="just">
+              <a:lnSpc>
+                <a:spcPts val="1900"/>
+              </a:lnSpc>
+              <a:buFont typeface="Arial" panose="020B0604020202020204" pitchFamily="34" charset="0"/>
+              <a:buChar char="•"/>
+            </a:pPr>
+            <a:r>
+              <a:rPr lang="es-MX" sz="1250" dirty="0">
+                <a:solidFill>
+                  <a:schemeClr val="tx1"/>
+                </a:solidFill>
+                <a:latin typeface="Barlow" panose="00000500000000000000" pitchFamily="2" charset="0"/>
+              </a:rPr>
+              <a:t>Tanto en colegios bilingües como no bilingües, la </a:t>
+            </a:r>
+            <a:r>
+              <a:rPr lang="es-MX" sz="1250" dirty="0">
+                <a:solidFill>
+                  <a:schemeClr val="accent1"/>
+                </a:solidFill>
+                <a:latin typeface="Barlow" panose="00000500000000000000" pitchFamily="2" charset="0"/>
+              </a:rPr>
+              <a:t>mayoría de estudiantes </a:t>
+            </a:r>
+            <a:r>
+              <a:rPr lang="es-MX" sz="1250" dirty="0">
+                <a:solidFill>
+                  <a:schemeClr val="tx1"/>
+                </a:solidFill>
+                <a:latin typeface="Barlow" panose="00000500000000000000" pitchFamily="2" charset="0"/>
+              </a:rPr>
+              <a:t>se encuentran en el </a:t>
+            </a:r>
+            <a:r>
+              <a:rPr lang="es-MX" sz="1250" b="1" dirty="0">
+                <a:solidFill>
+                  <a:schemeClr val="tx1"/>
+                </a:solidFill>
+                <a:latin typeface="Barlow" panose="00000500000000000000" pitchFamily="2" charset="0"/>
+              </a:rPr>
+              <a:t>rango 3</a:t>
+            </a:r>
+            <a:r>
+              <a:rPr lang="es-MX" sz="1250" dirty="0">
+                <a:solidFill>
+                  <a:schemeClr val="tx1"/>
+                </a:solidFill>
+                <a:latin typeface="Barlow" panose="00000500000000000000" pitchFamily="2" charset="0"/>
+              </a:rPr>
+              <a:t>.</a:t>
+            </a:r>
+          </a:p>
+          <a:p>
+            <a:pPr marL="285750" indent="-285750" algn="just">
+              <a:lnSpc>
+                <a:spcPts val="1900"/>
+              </a:lnSpc>
+              <a:buFont typeface="Arial" panose="020B0604020202020204" pitchFamily="34" charset="0"/>
+              <a:buChar char="•"/>
+            </a:pPr>
+            <a:endParaRPr lang="es-MX" sz="1250" dirty="0">
+              <a:solidFill>
+                <a:schemeClr val="tx1"/>
+              </a:solidFill>
+              <a:latin typeface="Barlow" panose="00000500000000000000" pitchFamily="2" charset="0"/>
+            </a:endParaRPr>
+          </a:p>
+          <a:p>
+            <a:pPr marL="285750" indent="-285750" algn="just">
+              <a:lnSpc>
+                <a:spcPts val="1900"/>
+              </a:lnSpc>
+              <a:buFont typeface="Arial" panose="020B0604020202020204" pitchFamily="34" charset="0"/>
+              <a:buChar char="•"/>
+            </a:pPr>
+            <a:r>
+              <a:rPr lang="es-MX" sz="1250" dirty="0">
+                <a:solidFill>
+                  <a:schemeClr val="tx1"/>
+                </a:solidFill>
+                <a:latin typeface="Barlow" panose="00000500000000000000" pitchFamily="2" charset="0"/>
+              </a:rPr>
+              <a:t>En los </a:t>
+            </a:r>
+            <a:r>
+              <a:rPr lang="es-MX" sz="1250" b="1" dirty="0">
+                <a:solidFill>
+                  <a:schemeClr val="tx1"/>
+                </a:solidFill>
+                <a:latin typeface="Barlow" panose="00000500000000000000" pitchFamily="2" charset="0"/>
+              </a:rPr>
+              <a:t>colegios bilingües</a:t>
+            </a:r>
+            <a:r>
+              <a:rPr lang="es-MX" sz="1250" dirty="0">
+                <a:solidFill>
+                  <a:schemeClr val="tx1"/>
+                </a:solidFill>
+                <a:latin typeface="Barlow" panose="00000500000000000000" pitchFamily="2" charset="0"/>
+              </a:rPr>
+              <a:t>, la cantidad de estudiantes es </a:t>
+            </a:r>
+            <a:r>
+              <a:rPr lang="es-MX" sz="1250" dirty="0">
+                <a:solidFill>
+                  <a:schemeClr val="accent1"/>
+                </a:solidFill>
+                <a:latin typeface="Barlow" panose="00000500000000000000" pitchFamily="2" charset="0"/>
+              </a:rPr>
+              <a:t>menor</a:t>
+            </a:r>
+            <a:r>
+              <a:rPr lang="es-MX" sz="1250" dirty="0">
+                <a:solidFill>
+                  <a:schemeClr val="tx1"/>
+                </a:solidFill>
+                <a:latin typeface="Barlow" panose="00000500000000000000" pitchFamily="2" charset="0"/>
+              </a:rPr>
+              <a:t> en comparación con los </a:t>
+            </a:r>
+            <a:r>
+              <a:rPr lang="es-MX" sz="1250" b="1" dirty="0">
+                <a:solidFill>
+                  <a:schemeClr val="tx1"/>
+                </a:solidFill>
+                <a:latin typeface="Barlow" panose="00000500000000000000" pitchFamily="2" charset="0"/>
+              </a:rPr>
+              <a:t>no bilingües</a:t>
+            </a:r>
+            <a:r>
+              <a:rPr lang="es-MX" sz="1250" dirty="0">
+                <a:solidFill>
+                  <a:schemeClr val="tx1"/>
+                </a:solidFill>
+                <a:latin typeface="Barlow" panose="00000500000000000000" pitchFamily="2" charset="0"/>
+              </a:rPr>
+              <a:t>.</a:t>
+            </a:r>
+          </a:p>
+          <a:p>
+            <a:pPr marL="285750" indent="-285750" algn="just">
+              <a:lnSpc>
+                <a:spcPts val="1900"/>
+              </a:lnSpc>
+              <a:buFont typeface="Arial" panose="020B0604020202020204" pitchFamily="34" charset="0"/>
+              <a:buChar char="•"/>
+            </a:pPr>
+            <a:endParaRPr lang="es-MX" sz="1250" dirty="0">
+              <a:solidFill>
+                <a:schemeClr val="tx1"/>
+              </a:solidFill>
+              <a:latin typeface="Barlow" panose="00000500000000000000" pitchFamily="2" charset="0"/>
+            </a:endParaRPr>
+          </a:p>
+          <a:p>
+            <a:pPr marL="285750" indent="-285750" algn="just">
+              <a:lnSpc>
+                <a:spcPts val="1900"/>
+              </a:lnSpc>
+              <a:buFont typeface="Arial" panose="020B0604020202020204" pitchFamily="34" charset="0"/>
+              <a:buChar char="•"/>
+            </a:pPr>
+            <a:r>
+              <a:rPr lang="es-MX" sz="1250" dirty="0">
+                <a:solidFill>
+                  <a:schemeClr val="tx1"/>
+                </a:solidFill>
+                <a:latin typeface="Barlow" panose="00000500000000000000" pitchFamily="2" charset="0"/>
+              </a:rPr>
+              <a:t>En el rango de </a:t>
+            </a:r>
+            <a:r>
+              <a:rPr lang="es-MX" sz="1250" b="1" dirty="0">
+                <a:solidFill>
+                  <a:schemeClr val="tx1"/>
+                </a:solidFill>
+                <a:latin typeface="Barlow" panose="00000500000000000000" pitchFamily="2" charset="0"/>
+              </a:rPr>
+              <a:t>puntaje 1</a:t>
+            </a:r>
+            <a:r>
+              <a:rPr lang="es-MX" sz="1250" dirty="0">
+                <a:solidFill>
+                  <a:schemeClr val="tx1"/>
+                </a:solidFill>
+                <a:latin typeface="Barlow" panose="00000500000000000000" pitchFamily="2" charset="0"/>
+              </a:rPr>
+              <a:t>, la cantidad de estudiantes en colegios no bilingües es </a:t>
+            </a:r>
+            <a:r>
+              <a:rPr lang="es-MX" sz="1250" dirty="0">
+                <a:solidFill>
+                  <a:schemeClr val="accent1"/>
+                </a:solidFill>
+                <a:latin typeface="Barlow" panose="00000500000000000000" pitchFamily="2" charset="0"/>
+              </a:rPr>
+              <a:t>mayor</a:t>
+            </a:r>
+            <a:r>
+              <a:rPr lang="es-MX" sz="1250" dirty="0">
+                <a:solidFill>
+                  <a:schemeClr val="tx1"/>
+                </a:solidFill>
+                <a:latin typeface="Barlow" panose="00000500000000000000" pitchFamily="2" charset="0"/>
+              </a:rPr>
+              <a:t> que en colegios bilingües.</a:t>
+            </a:r>
+          </a:p>
+          <a:p>
+            <a:pPr marL="285750" indent="-285750" algn="just">
+              <a:lnSpc>
+                <a:spcPts val="1900"/>
+              </a:lnSpc>
+              <a:buFont typeface="Arial" panose="020B0604020202020204" pitchFamily="34" charset="0"/>
+              <a:buChar char="•"/>
+            </a:pPr>
+            <a:endParaRPr lang="es-MX" sz="1250" b="0" i="0" dirty="0">
+              <a:solidFill>
+                <a:schemeClr val="tx1"/>
+              </a:solidFill>
+              <a:effectLst/>
+              <a:latin typeface="Barlow" panose="00000500000000000000" pitchFamily="2" charset="0"/>
+            </a:endParaRPr>
+          </a:p>
+        </p:txBody>
+      </p:sp>
+      <p:pic>
+        <p:nvPicPr>
+          <p:cNvPr id="4" name="Imagen 3">
+            <a:extLst>
+              <a:ext uri="{FF2B5EF4-FFF2-40B4-BE49-F238E27FC236}">
+                <a16:creationId xmlns:a16="http://schemas.microsoft.com/office/drawing/2014/main" id="{5143755C-2361-4283-8A27-0F45365D8887}"/>
+              </a:ext>
+            </a:extLst>
+          </p:cNvPr>
+          <p:cNvPicPr>
+            <a:picLocks noChangeAspect="1"/>
+          </p:cNvPicPr>
+          <p:nvPr/>
+        </p:nvPicPr>
+        <p:blipFill>
+          <a:blip r:embed="rId3"/>
+          <a:stretch>
+            <a:fillRect/>
+          </a:stretch>
+        </p:blipFill>
+        <p:spPr>
+          <a:xfrm>
+            <a:off x="302491" y="1456914"/>
+            <a:ext cx="5161609" cy="3241561"/>
+          </a:xfrm>
+          <a:prstGeom prst="rect">
+            <a:avLst/>
+          </a:prstGeom>
+        </p:spPr>
+      </p:pic>
+      <p:sp>
+        <p:nvSpPr>
+          <p:cNvPr id="9" name="CuadroTexto 8">
+            <a:extLst>
+              <a:ext uri="{FF2B5EF4-FFF2-40B4-BE49-F238E27FC236}">
+                <a16:creationId xmlns:a16="http://schemas.microsoft.com/office/drawing/2014/main" id="{83B261D8-06C1-407A-A5A6-226625200F2C}"/>
+              </a:ext>
+            </a:extLst>
+          </p:cNvPr>
+          <p:cNvSpPr txBox="1"/>
+          <p:nvPr/>
+        </p:nvSpPr>
+        <p:spPr>
+          <a:xfrm>
+            <a:off x="1282262" y="3616767"/>
+            <a:ext cx="325821" cy="215444"/>
+          </a:xfrm>
+          <a:prstGeom prst="rect">
+            <a:avLst/>
+          </a:prstGeom>
+          <a:noFill/>
+        </p:spPr>
+        <p:txBody>
+          <a:bodyPr wrap="square" rtlCol="0">
+            <a:spAutoFit/>
+          </a:bodyPr>
+          <a:lstStyle/>
+          <a:p>
+            <a:pPr algn="ctr"/>
+            <a:r>
+              <a:rPr lang="es-CO" sz="800" b="1" dirty="0">
+                <a:latin typeface="Barlow" panose="00000500000000000000" pitchFamily="2" charset="0"/>
+              </a:rPr>
+              <a:t>22</a:t>
+            </a:r>
+          </a:p>
+        </p:txBody>
+      </p:sp>
+      <p:sp>
+        <p:nvSpPr>
+          <p:cNvPr id="21" name="CuadroTexto 20">
+            <a:extLst>
+              <a:ext uri="{FF2B5EF4-FFF2-40B4-BE49-F238E27FC236}">
+                <a16:creationId xmlns:a16="http://schemas.microsoft.com/office/drawing/2014/main" id="{2C0FF0A0-7173-415E-BCAB-BE7FFEF22F54}"/>
+              </a:ext>
+            </a:extLst>
+          </p:cNvPr>
+          <p:cNvSpPr txBox="1"/>
+          <p:nvPr/>
+        </p:nvSpPr>
+        <p:spPr>
+          <a:xfrm>
+            <a:off x="1608083" y="1570539"/>
+            <a:ext cx="564098" cy="215444"/>
+          </a:xfrm>
+          <a:prstGeom prst="rect">
+            <a:avLst/>
+          </a:prstGeom>
+          <a:noFill/>
+        </p:spPr>
+        <p:txBody>
+          <a:bodyPr wrap="square" rtlCol="0">
+            <a:spAutoFit/>
+          </a:bodyPr>
+          <a:lstStyle/>
+          <a:p>
+            <a:pPr algn="ctr"/>
+            <a:r>
+              <a:rPr lang="es-CO" sz="800" b="1" dirty="0">
+                <a:latin typeface="Barlow" panose="00000500000000000000" pitchFamily="2" charset="0"/>
+              </a:rPr>
+              <a:t>13355</a:t>
+            </a:r>
+          </a:p>
+        </p:txBody>
+      </p:sp>
+      <p:sp>
+        <p:nvSpPr>
+          <p:cNvPr id="22" name="CuadroTexto 21">
+            <a:extLst>
+              <a:ext uri="{FF2B5EF4-FFF2-40B4-BE49-F238E27FC236}">
+                <a16:creationId xmlns:a16="http://schemas.microsoft.com/office/drawing/2014/main" id="{B149CC05-0B31-4890-BBA1-F4A0CB65591A}"/>
+              </a:ext>
+            </a:extLst>
+          </p:cNvPr>
+          <p:cNvSpPr txBox="1"/>
+          <p:nvPr/>
+        </p:nvSpPr>
+        <p:spPr>
+          <a:xfrm>
+            <a:off x="1403134" y="1769841"/>
+            <a:ext cx="504494" cy="215444"/>
+          </a:xfrm>
+          <a:prstGeom prst="rect">
+            <a:avLst/>
+          </a:prstGeom>
+          <a:noFill/>
+        </p:spPr>
+        <p:txBody>
+          <a:bodyPr wrap="square" rtlCol="0">
+            <a:spAutoFit/>
+          </a:bodyPr>
+          <a:lstStyle/>
+          <a:p>
+            <a:pPr algn="ctr"/>
+            <a:r>
+              <a:rPr lang="es-CO" sz="800" b="1" dirty="0">
+                <a:latin typeface="Barlow" panose="00000500000000000000" pitchFamily="2" charset="0"/>
+              </a:rPr>
+              <a:t>7443</a:t>
+            </a:r>
+          </a:p>
+        </p:txBody>
+      </p:sp>
+      <p:sp>
+        <p:nvSpPr>
+          <p:cNvPr id="23" name="CuadroTexto 22">
+            <a:extLst>
+              <a:ext uri="{FF2B5EF4-FFF2-40B4-BE49-F238E27FC236}">
+                <a16:creationId xmlns:a16="http://schemas.microsoft.com/office/drawing/2014/main" id="{A5217E27-6E54-491C-A7D9-4CED5813B059}"/>
+              </a:ext>
+            </a:extLst>
+          </p:cNvPr>
+          <p:cNvSpPr txBox="1"/>
+          <p:nvPr/>
+        </p:nvSpPr>
+        <p:spPr>
+          <a:xfrm>
+            <a:off x="1907873" y="1948123"/>
+            <a:ext cx="462454" cy="215444"/>
+          </a:xfrm>
+          <a:prstGeom prst="rect">
+            <a:avLst/>
+          </a:prstGeom>
+          <a:noFill/>
+        </p:spPr>
+        <p:txBody>
+          <a:bodyPr wrap="square" rtlCol="0">
+            <a:spAutoFit/>
+          </a:bodyPr>
+          <a:lstStyle/>
+          <a:p>
+            <a:pPr algn="ctr"/>
+            <a:r>
+              <a:rPr lang="es-CO" sz="800" b="1" dirty="0">
+                <a:latin typeface="Barlow" panose="00000500000000000000" pitchFamily="2" charset="0"/>
+              </a:rPr>
+              <a:t>4012</a:t>
+            </a:r>
+          </a:p>
+        </p:txBody>
+      </p:sp>
+      <p:sp>
+        <p:nvSpPr>
+          <p:cNvPr id="26" name="CuadroTexto 25">
+            <a:extLst>
+              <a:ext uri="{FF2B5EF4-FFF2-40B4-BE49-F238E27FC236}">
+                <a16:creationId xmlns:a16="http://schemas.microsoft.com/office/drawing/2014/main" id="{6808A1A5-99A3-411B-84C7-B892701BE04F}"/>
+              </a:ext>
+            </a:extLst>
+          </p:cNvPr>
+          <p:cNvSpPr txBox="1"/>
+          <p:nvPr/>
+        </p:nvSpPr>
+        <p:spPr>
+          <a:xfrm>
+            <a:off x="2125129" y="2830167"/>
+            <a:ext cx="462454" cy="215444"/>
+          </a:xfrm>
+          <a:prstGeom prst="rect">
+            <a:avLst/>
+          </a:prstGeom>
+          <a:noFill/>
+        </p:spPr>
+        <p:txBody>
+          <a:bodyPr wrap="square" rtlCol="0">
+            <a:spAutoFit/>
+          </a:bodyPr>
+          <a:lstStyle/>
+          <a:p>
+            <a:pPr algn="ctr"/>
+            <a:r>
+              <a:rPr lang="es-CO" sz="800" b="1" dirty="0">
+                <a:latin typeface="Barlow" panose="00000500000000000000" pitchFamily="2" charset="0"/>
+              </a:rPr>
+              <a:t>251</a:t>
+            </a:r>
+          </a:p>
+        </p:txBody>
+      </p:sp>
+      <p:sp>
+        <p:nvSpPr>
+          <p:cNvPr id="27" name="CuadroTexto 26">
+            <a:extLst>
+              <a:ext uri="{FF2B5EF4-FFF2-40B4-BE49-F238E27FC236}">
+                <a16:creationId xmlns:a16="http://schemas.microsoft.com/office/drawing/2014/main" id="{F647514D-9451-46D4-BF86-1460867AF911}"/>
+              </a:ext>
+            </a:extLst>
+          </p:cNvPr>
+          <p:cNvSpPr txBox="1"/>
+          <p:nvPr/>
+        </p:nvSpPr>
+        <p:spPr>
+          <a:xfrm>
+            <a:off x="3501408" y="4017881"/>
+            <a:ext cx="462454" cy="215444"/>
+          </a:xfrm>
+          <a:prstGeom prst="rect">
+            <a:avLst/>
+          </a:prstGeom>
+          <a:noFill/>
+        </p:spPr>
+        <p:txBody>
+          <a:bodyPr wrap="square" rtlCol="0">
+            <a:spAutoFit/>
+          </a:bodyPr>
+          <a:lstStyle/>
+          <a:p>
+            <a:pPr algn="ctr"/>
+            <a:r>
+              <a:rPr lang="es-CO" sz="800" b="1" dirty="0">
+                <a:latin typeface="Barlow" panose="00000500000000000000" pitchFamily="2" charset="0"/>
+              </a:rPr>
+              <a:t>6</a:t>
+            </a:r>
+          </a:p>
+        </p:txBody>
+      </p:sp>
+      <p:sp>
+        <p:nvSpPr>
+          <p:cNvPr id="28" name="CuadroTexto 27">
+            <a:extLst>
+              <a:ext uri="{FF2B5EF4-FFF2-40B4-BE49-F238E27FC236}">
+                <a16:creationId xmlns:a16="http://schemas.microsoft.com/office/drawing/2014/main" id="{DD14246C-3EEB-4FE3-8C2E-60FFF5D27FAD}"/>
+              </a:ext>
+            </a:extLst>
+          </p:cNvPr>
+          <p:cNvSpPr txBox="1"/>
+          <p:nvPr/>
+        </p:nvSpPr>
+        <p:spPr>
+          <a:xfrm>
+            <a:off x="3732635" y="2933478"/>
+            <a:ext cx="462454" cy="215444"/>
+          </a:xfrm>
+          <a:prstGeom prst="rect">
+            <a:avLst/>
+          </a:prstGeom>
+          <a:noFill/>
+        </p:spPr>
+        <p:txBody>
+          <a:bodyPr wrap="square" rtlCol="0">
+            <a:spAutoFit/>
+          </a:bodyPr>
+          <a:lstStyle/>
+          <a:p>
+            <a:pPr algn="ctr"/>
+            <a:r>
+              <a:rPr lang="es-CO" sz="800" b="1" dirty="0">
+                <a:latin typeface="Barlow" panose="00000500000000000000" pitchFamily="2" charset="0"/>
+              </a:rPr>
+              <a:t>188</a:t>
+            </a:r>
+          </a:p>
+        </p:txBody>
+      </p:sp>
+      <p:sp>
+        <p:nvSpPr>
+          <p:cNvPr id="29" name="CuadroTexto 28">
+            <a:extLst>
+              <a:ext uri="{FF2B5EF4-FFF2-40B4-BE49-F238E27FC236}">
+                <a16:creationId xmlns:a16="http://schemas.microsoft.com/office/drawing/2014/main" id="{FDD6DE9C-F466-4E56-B9F2-F3178DE13BCD}"/>
+              </a:ext>
+            </a:extLst>
+          </p:cNvPr>
+          <p:cNvSpPr txBox="1"/>
+          <p:nvPr/>
+        </p:nvSpPr>
+        <p:spPr>
+          <a:xfrm>
+            <a:off x="4189835" y="3249725"/>
+            <a:ext cx="462454" cy="215444"/>
+          </a:xfrm>
+          <a:prstGeom prst="rect">
+            <a:avLst/>
+          </a:prstGeom>
+          <a:noFill/>
+        </p:spPr>
+        <p:txBody>
+          <a:bodyPr wrap="square" rtlCol="0">
+            <a:spAutoFit/>
+          </a:bodyPr>
+          <a:lstStyle/>
+          <a:p>
+            <a:pPr algn="ctr"/>
+            <a:r>
+              <a:rPr lang="es-CO" sz="800" b="1" dirty="0">
+                <a:latin typeface="Barlow" panose="00000500000000000000" pitchFamily="2" charset="0"/>
+              </a:rPr>
+              <a:t>70</a:t>
+            </a:r>
+          </a:p>
+        </p:txBody>
+      </p:sp>
+      <p:sp>
+        <p:nvSpPr>
+          <p:cNvPr id="30" name="CuadroTexto 29">
+            <a:extLst>
+              <a:ext uri="{FF2B5EF4-FFF2-40B4-BE49-F238E27FC236}">
+                <a16:creationId xmlns:a16="http://schemas.microsoft.com/office/drawing/2014/main" id="{1BAF8C06-1B86-4379-9B9C-92C1F32D851A}"/>
+              </a:ext>
+            </a:extLst>
+          </p:cNvPr>
+          <p:cNvSpPr txBox="1"/>
+          <p:nvPr/>
+        </p:nvSpPr>
+        <p:spPr>
+          <a:xfrm>
+            <a:off x="3965326" y="2799755"/>
+            <a:ext cx="462454" cy="215444"/>
+          </a:xfrm>
+          <a:prstGeom prst="rect">
+            <a:avLst/>
+          </a:prstGeom>
+          <a:noFill/>
+        </p:spPr>
+        <p:txBody>
+          <a:bodyPr wrap="square" rtlCol="0">
+            <a:spAutoFit/>
+          </a:bodyPr>
+          <a:lstStyle/>
+          <a:p>
+            <a:pPr algn="ctr"/>
+            <a:r>
+              <a:rPr lang="es-CO" sz="800" b="1" dirty="0">
+                <a:latin typeface="Barlow" panose="00000500000000000000" pitchFamily="2" charset="0"/>
+              </a:rPr>
+              <a:t>292</a:t>
+            </a:r>
+          </a:p>
+        </p:txBody>
+      </p:sp>
+      <p:sp>
+        <p:nvSpPr>
+          <p:cNvPr id="31" name="CuadroTexto 30">
+            <a:extLst>
+              <a:ext uri="{FF2B5EF4-FFF2-40B4-BE49-F238E27FC236}">
+                <a16:creationId xmlns:a16="http://schemas.microsoft.com/office/drawing/2014/main" id="{6E1156FD-28DF-481B-9C42-046407B42F4B}"/>
+              </a:ext>
+            </a:extLst>
+          </p:cNvPr>
+          <p:cNvSpPr txBox="1"/>
+          <p:nvPr/>
+        </p:nvSpPr>
+        <p:spPr>
+          <a:xfrm>
+            <a:off x="4413248" y="3830881"/>
+            <a:ext cx="462454" cy="215444"/>
+          </a:xfrm>
+          <a:prstGeom prst="rect">
+            <a:avLst/>
+          </a:prstGeom>
+          <a:noFill/>
+        </p:spPr>
+        <p:txBody>
+          <a:bodyPr wrap="square" rtlCol="0">
+            <a:spAutoFit/>
+          </a:bodyPr>
+          <a:lstStyle/>
+          <a:p>
+            <a:pPr algn="ctr"/>
+            <a:r>
+              <a:rPr lang="es-CO" sz="800" b="1" dirty="0">
+                <a:latin typeface="Barlow" panose="00000500000000000000" pitchFamily="2" charset="0"/>
+              </a:rPr>
+              <a:t>12</a:t>
+            </a:r>
+          </a:p>
+        </p:txBody>
+      </p:sp>
+      <p:pic>
+        <p:nvPicPr>
+          <p:cNvPr id="35" name="Imagen 34">
+            <a:extLst>
+              <a:ext uri="{FF2B5EF4-FFF2-40B4-BE49-F238E27FC236}">
+                <a16:creationId xmlns:a16="http://schemas.microsoft.com/office/drawing/2014/main" id="{A519DE9F-7AA1-49DD-B4D7-56A24DAE2CCC}"/>
+              </a:ext>
+            </a:extLst>
+          </p:cNvPr>
+          <p:cNvPicPr>
+            <a:picLocks noChangeAspect="1"/>
+          </p:cNvPicPr>
+          <p:nvPr/>
+        </p:nvPicPr>
+        <p:blipFill>
+          <a:blip r:embed="rId4"/>
+          <a:stretch>
+            <a:fillRect/>
+          </a:stretch>
+        </p:blipFill>
+        <p:spPr>
+          <a:xfrm>
+            <a:off x="1378320" y="1372919"/>
+            <a:ext cx="3361845" cy="257022"/>
+          </a:xfrm>
+          <a:prstGeom prst="rect">
+            <a:avLst/>
+          </a:prstGeom>
+        </p:spPr>
+      </p:pic>
+      <p:pic>
+        <p:nvPicPr>
+          <p:cNvPr id="33" name="Imagen 32">
+            <a:extLst>
+              <a:ext uri="{FF2B5EF4-FFF2-40B4-BE49-F238E27FC236}">
+                <a16:creationId xmlns:a16="http://schemas.microsoft.com/office/drawing/2014/main" id="{38FA79FA-3C5E-429C-AA80-9D933727DC66}"/>
+              </a:ext>
+            </a:extLst>
+          </p:cNvPr>
+          <p:cNvPicPr>
+            <a:picLocks noChangeAspect="1"/>
+          </p:cNvPicPr>
+          <p:nvPr/>
+        </p:nvPicPr>
+        <p:blipFill>
+          <a:blip r:embed="rId5"/>
+          <a:stretch>
+            <a:fillRect/>
+          </a:stretch>
+        </p:blipFill>
+        <p:spPr>
+          <a:xfrm>
+            <a:off x="1282262" y="1247038"/>
+            <a:ext cx="3932253" cy="235935"/>
+          </a:xfrm>
+          <a:prstGeom prst="rect">
+            <a:avLst/>
+          </a:prstGeom>
+        </p:spPr>
+      </p:pic>
+    </p:spTree>
+    <p:extLst>
+      <p:ext uri="{BB962C8B-B14F-4D97-AF65-F5344CB8AC3E}">
+        <p14:creationId xmlns:p14="http://schemas.microsoft.com/office/powerpoint/2010/main" val="599631490"/>
       </p:ext>
     </p:extLst>
   </p:cSld>

</xml_diff>